<commit_message>
Update Covid Analysis Project (BW,KT,CP,MS,SF).pptx
Updated Covid Analsys PowerPoint Presentation
</commit_message>
<xml_diff>
--- a/Group_docs/Covid Analysis Project (BW,KT,CP,MS,SF).pptx
+++ b/Group_docs/Covid Analysis Project (BW,KT,CP,MS,SF).pptx
@@ -5,7 +5,7 @@
     <p:sldMasterId id="2147483905" r:id="rId1"/>
   </p:sldMasterIdLst>
   <p:notesMasterIdLst>
-    <p:notesMasterId r:id="rId23"/>
+    <p:notesMasterId r:id="rId24"/>
   </p:notesMasterIdLst>
   <p:sldIdLst>
     <p:sldId id="256" r:id="rId2"/>
@@ -15,20 +15,21 @@
     <p:sldId id="284" r:id="rId6"/>
     <p:sldId id="258" r:id="rId7"/>
     <p:sldId id="295" r:id="rId8"/>
-    <p:sldId id="282" r:id="rId9"/>
-    <p:sldId id="288" r:id="rId10"/>
-    <p:sldId id="268" r:id="rId11"/>
-    <p:sldId id="300" r:id="rId12"/>
-    <p:sldId id="294" r:id="rId13"/>
-    <p:sldId id="264" r:id="rId14"/>
-    <p:sldId id="265" r:id="rId15"/>
-    <p:sldId id="290" r:id="rId16"/>
-    <p:sldId id="291" r:id="rId17"/>
-    <p:sldId id="299" r:id="rId18"/>
-    <p:sldId id="292" r:id="rId19"/>
-    <p:sldId id="293" r:id="rId20"/>
-    <p:sldId id="296" r:id="rId21"/>
-    <p:sldId id="297" r:id="rId22"/>
+    <p:sldId id="301" r:id="rId9"/>
+    <p:sldId id="282" r:id="rId10"/>
+    <p:sldId id="288" r:id="rId11"/>
+    <p:sldId id="268" r:id="rId12"/>
+    <p:sldId id="300" r:id="rId13"/>
+    <p:sldId id="294" r:id="rId14"/>
+    <p:sldId id="264" r:id="rId15"/>
+    <p:sldId id="265" r:id="rId16"/>
+    <p:sldId id="290" r:id="rId17"/>
+    <p:sldId id="291" r:id="rId18"/>
+    <p:sldId id="299" r:id="rId19"/>
+    <p:sldId id="292" r:id="rId20"/>
+    <p:sldId id="293" r:id="rId21"/>
+    <p:sldId id="296" r:id="rId22"/>
+    <p:sldId id="297" r:id="rId23"/>
   </p:sldIdLst>
   <p:sldSz cx="9144000" cy="5143500" type="screen16x9"/>
   <p:notesSz cx="6858000" cy="9144000"/>
@@ -159,17 +160,25 @@
 <pc:chgInfo xmlns:a="http://schemas.openxmlformats.org/drawingml/2006/main" xmlns:r="http://schemas.openxmlformats.org/officeDocument/2006/relationships" xmlns:ac="http://schemas.microsoft.com/office/drawing/2013/main/command" xmlns:pc="http://schemas.microsoft.com/office/powerpoint/2013/main/command">
   <pc:docChgLst>
     <pc:chgData name="Keishauna Turner" userId="605c30ef3dcae328" providerId="LiveId" clId="{4CC694CD-001C-4F79-9039-132ED7110D26}"/>
-    <pc:docChg chg="custSel addSld modSld modShowInfo">
-      <pc:chgData name="Keishauna Turner" userId="605c30ef3dcae328" providerId="LiveId" clId="{4CC694CD-001C-4F79-9039-132ED7110D26}" dt="2021-04-17T15:36:53.190" v="20" actId="2"/>
+    <pc:docChg chg="undo custSel addSld modSld modShowInfo">
+      <pc:chgData name="Keishauna Turner" userId="605c30ef3dcae328" providerId="LiveId" clId="{4CC694CD-001C-4F79-9039-132ED7110D26}" dt="2021-04-17T17:29:34.050" v="467" actId="20577"/>
       <pc:docMkLst>
         <pc:docMk/>
       </pc:docMkLst>
       <pc:sldChg chg="modSp mod">
-        <pc:chgData name="Keishauna Turner" userId="605c30ef3dcae328" providerId="LiveId" clId="{4CC694CD-001C-4F79-9039-132ED7110D26}" dt="2021-04-17T15:36:53.190" v="20" actId="2"/>
+        <pc:chgData name="Keishauna Turner" userId="605c30ef3dcae328" providerId="LiveId" clId="{4CC694CD-001C-4F79-9039-132ED7110D26}" dt="2021-04-17T17:07:04.998" v="181" actId="14861"/>
         <pc:sldMkLst>
           <pc:docMk/>
           <pc:sldMk cId="0" sldId="256"/>
         </pc:sldMkLst>
+        <pc:spChg chg="mod">
+          <ac:chgData name="Keishauna Turner" userId="605c30ef3dcae328" providerId="LiveId" clId="{4CC694CD-001C-4F79-9039-132ED7110D26}" dt="2021-04-17T17:07:04.998" v="181" actId="14861"/>
+          <ac:spMkLst>
+            <pc:docMk/>
+            <pc:sldMk cId="0" sldId="256"/>
+            <ac:spMk id="263" creationId="{00000000-0000-0000-0000-000000000000}"/>
+          </ac:spMkLst>
+        </pc:spChg>
         <pc:spChg chg="mod">
           <ac:chgData name="Keishauna Turner" userId="605c30ef3dcae328" providerId="LiveId" clId="{4CC694CD-001C-4F79-9039-132ED7110D26}" dt="2021-04-17T15:36:53.190" v="20" actId="2"/>
           <ac:spMkLst>
@@ -180,7 +189,7 @@
         </pc:spChg>
       </pc:sldChg>
       <pc:sldChg chg="modSp mod">
-        <pc:chgData name="Keishauna Turner" userId="605c30ef3dcae328" providerId="LiveId" clId="{4CC694CD-001C-4F79-9039-132ED7110D26}" dt="2021-04-17T15:33:10.006" v="19" actId="20577"/>
+        <pc:chgData name="Keishauna Turner" userId="605c30ef3dcae328" providerId="LiveId" clId="{4CC694CD-001C-4F79-9039-132ED7110D26}" dt="2021-04-17T17:08:25.089" v="191" actId="1076"/>
         <pc:sldMkLst>
           <pc:docMk/>
           <pc:sldMk cId="0" sldId="257"/>
@@ -193,13 +202,169 @@
             <ac:spMk id="271" creationId="{00000000-0000-0000-0000-000000000000}"/>
           </ac:spMkLst>
         </pc:spChg>
+        <pc:spChg chg="mod">
+          <ac:chgData name="Keishauna Turner" userId="605c30ef3dcae328" providerId="LiveId" clId="{4CC694CD-001C-4F79-9039-132ED7110D26}" dt="2021-04-17T17:08:25.089" v="191" actId="1076"/>
+          <ac:spMkLst>
+            <pc:docMk/>
+            <pc:sldMk cId="0" sldId="257"/>
+            <ac:spMk id="274" creationId="{00000000-0000-0000-0000-000000000000}"/>
+          </ac:spMkLst>
+        </pc:spChg>
       </pc:sldChg>
-      <pc:sldChg chg="delSp modSp mod">
-        <pc:chgData name="Keishauna Turner" userId="605c30ef3dcae328" providerId="LiveId" clId="{4CC694CD-001C-4F79-9039-132ED7110D26}" dt="2021-04-17T14:32:04.876" v="11" actId="1076"/>
+      <pc:sldChg chg="modSp mod">
+        <pc:chgData name="Keishauna Turner" userId="605c30ef3dcae328" providerId="LiveId" clId="{4CC694CD-001C-4F79-9039-132ED7110D26}" dt="2021-04-17T17:07:36.540" v="185" actId="255"/>
+        <pc:sldMkLst>
+          <pc:docMk/>
+          <pc:sldMk cId="0" sldId="258"/>
+        </pc:sldMkLst>
+        <pc:spChg chg="mod">
+          <ac:chgData name="Keishauna Turner" userId="605c30ef3dcae328" providerId="LiveId" clId="{4CC694CD-001C-4F79-9039-132ED7110D26}" dt="2021-04-17T17:07:36.540" v="185" actId="255"/>
+          <ac:spMkLst>
+            <pc:docMk/>
+            <pc:sldMk cId="0" sldId="258"/>
+            <ac:spMk id="281" creationId="{00000000-0000-0000-0000-000000000000}"/>
+          </ac:spMkLst>
+        </pc:spChg>
+      </pc:sldChg>
+      <pc:sldChg chg="modSp mod">
+        <pc:chgData name="Keishauna Turner" userId="605c30ef3dcae328" providerId="LiveId" clId="{4CC694CD-001C-4F79-9039-132ED7110D26}" dt="2021-04-17T17:08:17.728" v="190" actId="1076"/>
+        <pc:sldMkLst>
+          <pc:docMk/>
+          <pc:sldMk cId="0" sldId="259"/>
+        </pc:sldMkLst>
+        <pc:spChg chg="mod">
+          <ac:chgData name="Keishauna Turner" userId="605c30ef3dcae328" providerId="LiveId" clId="{4CC694CD-001C-4F79-9039-132ED7110D26}" dt="2021-04-17T17:08:13.586" v="189" actId="1076"/>
+          <ac:spMkLst>
+            <pc:docMk/>
+            <pc:sldMk cId="0" sldId="259"/>
+            <ac:spMk id="283" creationId="{00000000-0000-0000-0000-000000000000}"/>
+          </ac:spMkLst>
+        </pc:spChg>
+        <pc:spChg chg="mod">
+          <ac:chgData name="Keishauna Turner" userId="605c30ef3dcae328" providerId="LiveId" clId="{4CC694CD-001C-4F79-9039-132ED7110D26}" dt="2021-04-17T17:08:17.728" v="190" actId="1076"/>
+          <ac:spMkLst>
+            <pc:docMk/>
+            <pc:sldMk cId="0" sldId="259"/>
+            <ac:spMk id="285" creationId="{00000000-0000-0000-0000-000000000000}"/>
+          </ac:spMkLst>
+        </pc:spChg>
+      </pc:sldChg>
+      <pc:sldChg chg="addSp delSp modSp mod setBg chgLayout">
+        <pc:chgData name="Keishauna Turner" userId="605c30ef3dcae328" providerId="LiveId" clId="{4CC694CD-001C-4F79-9039-132ED7110D26}" dt="2021-04-17T17:10:40.520" v="207" actId="115"/>
+        <pc:sldMkLst>
+          <pc:docMk/>
+          <pc:sldMk cId="0" sldId="264"/>
+        </pc:sldMkLst>
+        <pc:spChg chg="add mod ord">
+          <ac:chgData name="Keishauna Turner" userId="605c30ef3dcae328" providerId="LiveId" clId="{4CC694CD-001C-4F79-9039-132ED7110D26}" dt="2021-04-17T17:10:40.520" v="207" actId="115"/>
+          <ac:spMkLst>
+            <pc:docMk/>
+            <pc:sldMk cId="0" sldId="264"/>
+            <ac:spMk id="2" creationId="{9883FFB5-7EEA-4788-857E-C410D75F2A9C}"/>
+          </ac:spMkLst>
+        </pc:spChg>
+        <pc:spChg chg="add mod ord">
+          <ac:chgData name="Keishauna Turner" userId="605c30ef3dcae328" providerId="LiveId" clId="{4CC694CD-001C-4F79-9039-132ED7110D26}" dt="2021-04-17T16:52:40.558" v="44" actId="26606"/>
+          <ac:spMkLst>
+            <pc:docMk/>
+            <pc:sldMk cId="0" sldId="264"/>
+            <ac:spMk id="3" creationId="{5A6C5E70-0D34-48D6-BC4C-BDE6C7335B10}"/>
+          </ac:spMkLst>
+        </pc:spChg>
+        <pc:spChg chg="del">
+          <ac:chgData name="Keishauna Turner" userId="605c30ef3dcae328" providerId="LiveId" clId="{4CC694CD-001C-4F79-9039-132ED7110D26}" dt="2021-04-17T16:52:23.211" v="42" actId="700"/>
+          <ac:spMkLst>
+            <pc:docMk/>
+            <pc:sldMk cId="0" sldId="264"/>
+            <ac:spMk id="300" creationId="{00000000-0000-0000-0000-000000000000}"/>
+          </ac:spMkLst>
+        </pc:spChg>
+        <pc:spChg chg="del">
+          <ac:chgData name="Keishauna Turner" userId="605c30ef3dcae328" providerId="LiveId" clId="{4CC694CD-001C-4F79-9039-132ED7110D26}" dt="2021-04-17T16:52:23.211" v="42" actId="700"/>
+          <ac:spMkLst>
+            <pc:docMk/>
+            <pc:sldMk cId="0" sldId="264"/>
+            <ac:spMk id="301" creationId="{00000000-0000-0000-0000-000000000000}"/>
+          </ac:spMkLst>
+        </pc:spChg>
+        <pc:grpChg chg="add del">
+          <ac:chgData name="Keishauna Turner" userId="605c30ef3dcae328" providerId="LiveId" clId="{4CC694CD-001C-4F79-9039-132ED7110D26}" dt="2021-04-17T16:52:40.558" v="44" actId="26606"/>
+          <ac:grpSpMkLst>
+            <pc:docMk/>
+            <pc:sldMk cId="0" sldId="264"/>
+            <ac:grpSpMk id="117" creationId="{A838DBA2-246D-4087-AE0A-6EA2B4B65AF3}"/>
+          </ac:grpSpMkLst>
+        </pc:grpChg>
+        <pc:grpChg chg="add del">
+          <ac:chgData name="Keishauna Turner" userId="605c30ef3dcae328" providerId="LiveId" clId="{4CC694CD-001C-4F79-9039-132ED7110D26}" dt="2021-04-17T16:52:40.558" v="44" actId="26606"/>
+          <ac:grpSpMkLst>
+            <pc:docMk/>
+            <pc:sldMk cId="0" sldId="264"/>
+            <ac:grpSpMk id="158" creationId="{A0B38558-5389-4817-936F-FD62560CAC11}"/>
+          </ac:grpSpMkLst>
+        </pc:grpChg>
+        <pc:grpChg chg="add del">
+          <ac:chgData name="Keishauna Turner" userId="605c30ef3dcae328" providerId="LiveId" clId="{4CC694CD-001C-4F79-9039-132ED7110D26}" dt="2021-04-17T16:52:40.558" v="44" actId="26606"/>
+          <ac:grpSpMkLst>
+            <pc:docMk/>
+            <pc:sldMk cId="0" sldId="264"/>
+            <ac:grpSpMk id="162" creationId="{15502586-682B-4EDF-9515-674BB4E1CD13}"/>
+          </ac:grpSpMkLst>
+        </pc:grpChg>
+        <pc:picChg chg="add del">
+          <ac:chgData name="Keishauna Turner" userId="605c30ef3dcae328" providerId="LiveId" clId="{4CC694CD-001C-4F79-9039-132ED7110D26}" dt="2021-04-17T16:52:40.558" v="44" actId="26606"/>
+          <ac:picMkLst>
+            <pc:docMk/>
+            <pc:sldMk cId="0" sldId="264"/>
+            <ac:picMk id="115" creationId="{59FACE42-44B0-4185-8ED4-9043A78C8600}"/>
+          </ac:picMkLst>
+        </pc:picChg>
+        <pc:picChg chg="mod ord">
+          <ac:chgData name="Keishauna Turner" userId="605c30ef3dcae328" providerId="LiveId" clId="{4CC694CD-001C-4F79-9039-132ED7110D26}" dt="2021-04-17T16:53:49.164" v="94" actId="1076"/>
+          <ac:picMkLst>
+            <pc:docMk/>
+            <pc:sldMk cId="0" sldId="264"/>
+            <ac:picMk id="302" creationId="{00000000-0000-0000-0000-000000000000}"/>
+          </ac:picMkLst>
+        </pc:picChg>
+      </pc:sldChg>
+      <pc:sldChg chg="modSp mod">
+        <pc:chgData name="Keishauna Turner" userId="605c30ef3dcae328" providerId="LiveId" clId="{4CC694CD-001C-4F79-9039-132ED7110D26}" dt="2021-04-17T17:10:59.107" v="211" actId="14100"/>
+        <pc:sldMkLst>
+          <pc:docMk/>
+          <pc:sldMk cId="0" sldId="265"/>
+        </pc:sldMkLst>
+        <pc:spChg chg="mod">
+          <ac:chgData name="Keishauna Turner" userId="605c30ef3dcae328" providerId="LiveId" clId="{4CC694CD-001C-4F79-9039-132ED7110D26}" dt="2021-04-17T17:10:59.107" v="211" actId="14100"/>
+          <ac:spMkLst>
+            <pc:docMk/>
+            <pc:sldMk cId="0" sldId="265"/>
+            <ac:spMk id="304" creationId="{00000000-0000-0000-0000-000000000000}"/>
+          </ac:spMkLst>
+        </pc:spChg>
+      </pc:sldChg>
+      <pc:sldChg chg="addSp delSp modSp mod modClrScheme chgLayout">
+        <pc:chgData name="Keishauna Turner" userId="605c30ef3dcae328" providerId="LiveId" clId="{4CC694CD-001C-4F79-9039-132ED7110D26}" dt="2021-04-17T17:06:10.634" v="177" actId="115"/>
         <pc:sldMkLst>
           <pc:docMk/>
           <pc:sldMk cId="0" sldId="268"/>
         </pc:sldMkLst>
+        <pc:spChg chg="add mod ord">
+          <ac:chgData name="Keishauna Turner" userId="605c30ef3dcae328" providerId="LiveId" clId="{4CC694CD-001C-4F79-9039-132ED7110D26}" dt="2021-04-17T17:06:10.634" v="177" actId="115"/>
+          <ac:spMkLst>
+            <pc:docMk/>
+            <pc:sldMk cId="0" sldId="268"/>
+            <ac:spMk id="2" creationId="{97A79D67-053A-4210-98FC-A518CF5F186B}"/>
+          </ac:spMkLst>
+        </pc:spChg>
+        <pc:spChg chg="add del mod ord">
+          <ac:chgData name="Keishauna Turner" userId="605c30ef3dcae328" providerId="LiveId" clId="{4CC694CD-001C-4F79-9039-132ED7110D26}" dt="2021-04-17T16:56:06.640" v="139" actId="21"/>
+          <ac:spMkLst>
+            <pc:docMk/>
+            <pc:sldMk cId="0" sldId="268"/>
+            <ac:spMk id="3" creationId="{75CADD75-6866-4DFF-8F8F-139B292A46E6}"/>
+          </ac:spMkLst>
+        </pc:spChg>
         <pc:picChg chg="del">
           <ac:chgData name="Keishauna Turner" userId="605c30ef3dcae328" providerId="LiveId" clId="{4CC694CD-001C-4F79-9039-132ED7110D26}" dt="2021-04-17T14:31:52.956" v="7" actId="21"/>
           <ac:picMkLst>
@@ -209,7 +374,7 @@
           </ac:picMkLst>
         </pc:picChg>
         <pc:picChg chg="mod">
-          <ac:chgData name="Keishauna Turner" userId="605c30ef3dcae328" providerId="LiveId" clId="{4CC694CD-001C-4F79-9039-132ED7110D26}" dt="2021-04-17T14:32:04.876" v="11" actId="1076"/>
+          <ac:chgData name="Keishauna Turner" userId="605c30ef3dcae328" providerId="LiveId" clId="{4CC694CD-001C-4F79-9039-132ED7110D26}" dt="2021-04-17T16:55:47.805" v="134" actId="1076"/>
           <ac:picMkLst>
             <pc:docMk/>
             <pc:sldMk cId="0" sldId="268"/>
@@ -217,14 +382,114 @@
           </ac:picMkLst>
         </pc:picChg>
       </pc:sldChg>
-      <pc:sldChg chg="delSp modSp add mod">
-        <pc:chgData name="Keishauna Turner" userId="605c30ef3dcae328" providerId="LiveId" clId="{4CC694CD-001C-4F79-9039-132ED7110D26}" dt="2021-04-17T14:33:59.055" v="12" actId="14100"/>
+      <pc:sldChg chg="modSp mod">
+        <pc:chgData name="Keishauna Turner" userId="605c30ef3dcae328" providerId="LiveId" clId="{4CC694CD-001C-4F79-9039-132ED7110D26}" dt="2021-04-17T17:07:25.342" v="183" actId="2711"/>
+        <pc:sldMkLst>
+          <pc:docMk/>
+          <pc:sldMk cId="2871576865" sldId="284"/>
+        </pc:sldMkLst>
+        <pc:spChg chg="mod">
+          <ac:chgData name="Keishauna Turner" userId="605c30ef3dcae328" providerId="LiveId" clId="{4CC694CD-001C-4F79-9039-132ED7110D26}" dt="2021-04-17T17:07:25.342" v="183" actId="2711"/>
+          <ac:spMkLst>
+            <pc:docMk/>
+            <pc:sldMk cId="2871576865" sldId="284"/>
+            <ac:spMk id="281" creationId="{00000000-0000-0000-0000-000000000000}"/>
+          </ac:spMkLst>
+        </pc:spChg>
+      </pc:sldChg>
+      <pc:sldChg chg="modSp mod">
+        <pc:chgData name="Keishauna Turner" userId="605c30ef3dcae328" providerId="LiveId" clId="{4CC694CD-001C-4F79-9039-132ED7110D26}" dt="2021-04-17T16:47:40.752" v="31" actId="20577"/>
+        <pc:sldMkLst>
+          <pc:docMk/>
+          <pc:sldMk cId="821485406" sldId="291"/>
+        </pc:sldMkLst>
+        <pc:spChg chg="mod">
+          <ac:chgData name="Keishauna Turner" userId="605c30ef3dcae328" providerId="LiveId" clId="{4CC694CD-001C-4F79-9039-132ED7110D26}" dt="2021-04-17T16:47:40.752" v="31" actId="20577"/>
+          <ac:spMkLst>
+            <pc:docMk/>
+            <pc:sldMk cId="821485406" sldId="291"/>
+            <ac:spMk id="306" creationId="{00000000-0000-0000-0000-000000000000}"/>
+          </ac:spMkLst>
+        </pc:spChg>
+      </pc:sldChg>
+      <pc:sldChg chg="modSp mod">
+        <pc:chgData name="Keishauna Turner" userId="605c30ef3dcae328" providerId="LiveId" clId="{4CC694CD-001C-4F79-9039-132ED7110D26}" dt="2021-04-17T17:26:02.801" v="457" actId="20577"/>
+        <pc:sldMkLst>
+          <pc:docMk/>
+          <pc:sldMk cId="570238601" sldId="294"/>
+        </pc:sldMkLst>
+        <pc:spChg chg="mod">
+          <ac:chgData name="Keishauna Turner" userId="605c30ef3dcae328" providerId="LiveId" clId="{4CC694CD-001C-4F79-9039-132ED7110D26}" dt="2021-04-17T17:10:30.658" v="204" actId="1076"/>
+          <ac:spMkLst>
+            <pc:docMk/>
+            <pc:sldMk cId="570238601" sldId="294"/>
+            <ac:spMk id="6" creationId="{E24E6EC2-EDB6-4CD5-A38D-A5F1FE7ADDD5}"/>
+          </ac:spMkLst>
+        </pc:spChg>
+        <pc:spChg chg="mod">
+          <ac:chgData name="Keishauna Turner" userId="605c30ef3dcae328" providerId="LiveId" clId="{4CC694CD-001C-4F79-9039-132ED7110D26}" dt="2021-04-17T17:26:02.801" v="457" actId="20577"/>
+          <ac:spMkLst>
+            <pc:docMk/>
+            <pc:sldMk cId="570238601" sldId="294"/>
+            <ac:spMk id="304" creationId="{00000000-0000-0000-0000-000000000000}"/>
+          </ac:spMkLst>
+        </pc:spChg>
+      </pc:sldChg>
+      <pc:sldChg chg="modSp mod">
+        <pc:chgData name="Keishauna Turner" userId="605c30ef3dcae328" providerId="LiveId" clId="{4CC694CD-001C-4F79-9039-132ED7110D26}" dt="2021-04-17T16:57:35.759" v="170" actId="1076"/>
+        <pc:sldMkLst>
+          <pc:docMk/>
+          <pc:sldMk cId="1562976647" sldId="295"/>
+        </pc:sldMkLst>
+        <pc:spChg chg="mod">
+          <ac:chgData name="Keishauna Turner" userId="605c30ef3dcae328" providerId="LiveId" clId="{4CC694CD-001C-4F79-9039-132ED7110D26}" dt="2021-04-17T16:57:30.965" v="169" actId="1076"/>
+          <ac:spMkLst>
+            <pc:docMk/>
+            <pc:sldMk cId="1562976647" sldId="295"/>
+            <ac:spMk id="277" creationId="{00000000-0000-0000-0000-000000000000}"/>
+          </ac:spMkLst>
+        </pc:spChg>
+        <pc:spChg chg="mod">
+          <ac:chgData name="Keishauna Turner" userId="605c30ef3dcae328" providerId="LiveId" clId="{4CC694CD-001C-4F79-9039-132ED7110D26}" dt="2021-04-17T16:57:35.759" v="170" actId="1076"/>
+          <ac:spMkLst>
+            <pc:docMk/>
+            <pc:sldMk cId="1562976647" sldId="295"/>
+            <ac:spMk id="279" creationId="{00000000-0000-0000-0000-000000000000}"/>
+          </ac:spMkLst>
+        </pc:spChg>
+        <pc:spChg chg="mod">
+          <ac:chgData name="Keishauna Turner" userId="605c30ef3dcae328" providerId="LiveId" clId="{4CC694CD-001C-4F79-9039-132ED7110D26}" dt="2021-04-17T16:57:28.082" v="168" actId="1076"/>
+          <ac:spMkLst>
+            <pc:docMk/>
+            <pc:sldMk cId="1562976647" sldId="295"/>
+            <ac:spMk id="281" creationId="{00000000-0000-0000-0000-000000000000}"/>
+          </ac:spMkLst>
+        </pc:spChg>
+      </pc:sldChg>
+      <pc:sldChg chg="addSp delSp modSp add mod modClrScheme chgLayout">
+        <pc:chgData name="Keishauna Turner" userId="605c30ef3dcae328" providerId="LiveId" clId="{4CC694CD-001C-4F79-9039-132ED7110D26}" dt="2021-04-17T17:09:51.948" v="202"/>
         <pc:sldMkLst>
           <pc:docMk/>
           <pc:sldMk cId="3555751499" sldId="300"/>
         </pc:sldMkLst>
+        <pc:spChg chg="add mod ord">
+          <ac:chgData name="Keishauna Turner" userId="605c30ef3dcae328" providerId="LiveId" clId="{4CC694CD-001C-4F79-9039-132ED7110D26}" dt="2021-04-17T17:09:51.948" v="202"/>
+          <ac:spMkLst>
+            <pc:docMk/>
+            <pc:sldMk cId="3555751499" sldId="300"/>
+            <ac:spMk id="2" creationId="{54E6A084-C889-45F1-A6F6-192F938CD397}"/>
+          </ac:spMkLst>
+        </pc:spChg>
+        <pc:spChg chg="add del mod ord">
+          <ac:chgData name="Keishauna Turner" userId="605c30ef3dcae328" providerId="LiveId" clId="{4CC694CD-001C-4F79-9039-132ED7110D26}" dt="2021-04-17T16:54:28.714" v="101" actId="21"/>
+          <ac:spMkLst>
+            <pc:docMk/>
+            <pc:sldMk cId="3555751499" sldId="300"/>
+            <ac:spMk id="4" creationId="{F3BBE204-4E17-4829-94CA-6EB21FB96559}"/>
+          </ac:spMkLst>
+        </pc:spChg>
         <pc:picChg chg="mod">
-          <ac:chgData name="Keishauna Turner" userId="605c30ef3dcae328" providerId="LiveId" clId="{4CC694CD-001C-4F79-9039-132ED7110D26}" dt="2021-04-17T14:33:59.055" v="12" actId="14100"/>
+          <ac:chgData name="Keishauna Turner" userId="605c30ef3dcae328" providerId="LiveId" clId="{4CC694CD-001C-4F79-9039-132ED7110D26}" dt="2021-04-17T17:09:23.479" v="193" actId="1076"/>
           <ac:picMkLst>
             <pc:docMk/>
             <pc:sldMk cId="3555751499" sldId="300"/>
@@ -239,6 +504,21 @@
             <ac:picMk id="315" creationId="{00000000-0000-0000-0000-000000000000}"/>
           </ac:picMkLst>
         </pc:picChg>
+      </pc:sldChg>
+      <pc:sldChg chg="modSp new mod modTransition">
+        <pc:chgData name="Keishauna Turner" userId="605c30ef3dcae328" providerId="LiveId" clId="{4CC694CD-001C-4F79-9039-132ED7110D26}" dt="2021-04-17T17:29:34.050" v="467" actId="20577"/>
+        <pc:sldMkLst>
+          <pc:docMk/>
+          <pc:sldMk cId="4225360146" sldId="301"/>
+        </pc:sldMkLst>
+        <pc:spChg chg="mod">
+          <ac:chgData name="Keishauna Turner" userId="605c30ef3dcae328" providerId="LiveId" clId="{4CC694CD-001C-4F79-9039-132ED7110D26}" dt="2021-04-17T17:29:34.050" v="467" actId="20577"/>
+          <ac:spMkLst>
+            <pc:docMk/>
+            <pc:sldMk cId="4225360146" sldId="301"/>
+            <ac:spMk id="2" creationId="{CDDFFB13-2255-454B-92E3-1AEFF6F36E36}"/>
+          </ac:spMkLst>
+        </pc:spChg>
       </pc:sldChg>
     </pc:docChg>
   </pc:docChgLst>
@@ -541,7 +821,7 @@
           <a:noFill/>
           <a:extLst>
             <a:ext uri="{909E8E84-426E-40dd-AFC4-6F175D3DCCD1}">
-              <a14:hiddenFill xmlns:a14="http://schemas.microsoft.com/office/drawing/2010/main" xmlns="">
+              <a14:hiddenFill xmlns="" xmlns:a14="http://schemas.microsoft.com/office/drawing/2010/main">
                 <a:solidFill>
                   <a:srgbClr val="FFFFFF"/>
                 </a:solidFill>
@@ -601,7 +881,7 @@
             </a:ln>
             <a:extLst>
               <a:ext uri="{91240B29-F687-4f45-9708-019B960494DF}">
-                <a14:hiddenLine xmlns:a14="http://schemas.microsoft.com/office/drawing/2010/main" xmlns="" w="9525">
+                <a14:hiddenLine xmlns="" xmlns:a14="http://schemas.microsoft.com/office/drawing/2010/main" w="9525">
                   <a:solidFill>
                     <a:srgbClr val="000000"/>
                   </a:solidFill>
@@ -691,7 +971,7 @@
             </a:ln>
             <a:extLst>
               <a:ext uri="{91240B29-F687-4f45-9708-019B960494DF}">
-                <a14:hiddenLine xmlns:a14="http://schemas.microsoft.com/office/drawing/2010/main" xmlns="" w="9525">
+                <a14:hiddenLine xmlns="" xmlns:a14="http://schemas.microsoft.com/office/drawing/2010/main" w="9525">
                   <a:solidFill>
                     <a:srgbClr val="000000"/>
                   </a:solidFill>
@@ -781,7 +1061,7 @@
             </a:ln>
             <a:extLst>
               <a:ext uri="{91240B29-F687-4f45-9708-019B960494DF}">
-                <a14:hiddenLine xmlns:a14="http://schemas.microsoft.com/office/drawing/2010/main" xmlns="" w="9525">
+                <a14:hiddenLine xmlns="" xmlns:a14="http://schemas.microsoft.com/office/drawing/2010/main" w="9525">
                   <a:solidFill>
                     <a:srgbClr val="000000"/>
                   </a:solidFill>
@@ -815,7 +1095,7 @@
             </a:ln>
             <a:extLst>
               <a:ext uri="{91240B29-F687-4f45-9708-019B960494DF}">
-                <a14:hiddenLine xmlns:a14="http://schemas.microsoft.com/office/drawing/2010/main" xmlns="" w="9525">
+                <a14:hiddenLine xmlns="" xmlns:a14="http://schemas.microsoft.com/office/drawing/2010/main" w="9525">
                   <a:solidFill>
                     <a:srgbClr val="000000"/>
                   </a:solidFill>
@@ -905,7 +1185,7 @@
             </a:ln>
             <a:extLst>
               <a:ext uri="{91240B29-F687-4f45-9708-019B960494DF}">
-                <a14:hiddenLine xmlns:a14="http://schemas.microsoft.com/office/drawing/2010/main" xmlns="" w="9525">
+                <a14:hiddenLine xmlns="" xmlns:a14="http://schemas.microsoft.com/office/drawing/2010/main" w="9525">
                   <a:solidFill>
                     <a:srgbClr val="000000"/>
                   </a:solidFill>
@@ -967,7 +1247,7 @@
             </a:ln>
             <a:extLst>
               <a:ext uri="{91240B29-F687-4f45-9708-019B960494DF}">
-                <a14:hiddenLine xmlns:a14="http://schemas.microsoft.com/office/drawing/2010/main" xmlns="" w="9525">
+                <a14:hiddenLine xmlns="" xmlns:a14="http://schemas.microsoft.com/office/drawing/2010/main" w="9525">
                   <a:solidFill>
                     <a:srgbClr val="000000"/>
                   </a:solidFill>
@@ -1029,7 +1309,7 @@
             </a:ln>
             <a:extLst>
               <a:ext uri="{91240B29-F687-4f45-9708-019B960494DF}">
-                <a14:hiddenLine xmlns:a14="http://schemas.microsoft.com/office/drawing/2010/main" xmlns="" w="9525">
+                <a14:hiddenLine xmlns="" xmlns:a14="http://schemas.microsoft.com/office/drawing/2010/main" w="9525">
                   <a:solidFill>
                     <a:srgbClr val="000000"/>
                   </a:solidFill>
@@ -1119,7 +1399,7 @@
             </a:ln>
             <a:extLst>
               <a:ext uri="{91240B29-F687-4f45-9708-019B960494DF}">
-                <a14:hiddenLine xmlns:a14="http://schemas.microsoft.com/office/drawing/2010/main" xmlns="" w="9525">
+                <a14:hiddenLine xmlns="" xmlns:a14="http://schemas.microsoft.com/office/drawing/2010/main" w="9525">
                   <a:solidFill>
                     <a:srgbClr val="000000"/>
                   </a:solidFill>
@@ -1181,7 +1461,7 @@
             </a:ln>
             <a:extLst>
               <a:ext uri="{91240B29-F687-4f45-9708-019B960494DF}">
-                <a14:hiddenLine xmlns:a14="http://schemas.microsoft.com/office/drawing/2010/main" xmlns="" w="9525">
+                <a14:hiddenLine xmlns="" xmlns:a14="http://schemas.microsoft.com/office/drawing/2010/main" w="9525">
                   <a:solidFill>
                     <a:srgbClr val="000000"/>
                   </a:solidFill>
@@ -1243,7 +1523,7 @@
             </a:ln>
             <a:extLst>
               <a:ext uri="{91240B29-F687-4f45-9708-019B960494DF}">
-                <a14:hiddenLine xmlns:a14="http://schemas.microsoft.com/office/drawing/2010/main" xmlns="" w="9525">
+                <a14:hiddenLine xmlns="" xmlns:a14="http://schemas.microsoft.com/office/drawing/2010/main" w="9525">
                   <a:solidFill>
                     <a:srgbClr val="000000"/>
                   </a:solidFill>
@@ -1333,7 +1613,7 @@
             </a:ln>
             <a:extLst>
               <a:ext uri="{91240B29-F687-4f45-9708-019B960494DF}">
-                <a14:hiddenLine xmlns:a14="http://schemas.microsoft.com/office/drawing/2010/main" xmlns="" w="9525">
+                <a14:hiddenLine xmlns="" xmlns:a14="http://schemas.microsoft.com/office/drawing/2010/main" w="9525">
                   <a:solidFill>
                     <a:srgbClr val="000000"/>
                   </a:solidFill>
@@ -1423,7 +1703,7 @@
             </a:ln>
             <a:extLst>
               <a:ext uri="{91240B29-F687-4f45-9708-019B960494DF}">
-                <a14:hiddenLine xmlns:a14="http://schemas.microsoft.com/office/drawing/2010/main" xmlns="" w="9525">
+                <a14:hiddenLine xmlns="" xmlns:a14="http://schemas.microsoft.com/office/drawing/2010/main" w="9525">
                   <a:solidFill>
                     <a:srgbClr val="000000"/>
                   </a:solidFill>
@@ -1485,7 +1765,7 @@
             </a:ln>
             <a:extLst>
               <a:ext uri="{91240B29-F687-4f45-9708-019B960494DF}">
-                <a14:hiddenLine xmlns:a14="http://schemas.microsoft.com/office/drawing/2010/main" xmlns="" w="9525">
+                <a14:hiddenLine xmlns="" xmlns:a14="http://schemas.microsoft.com/office/drawing/2010/main" w="9525">
                   <a:solidFill>
                     <a:srgbClr val="000000"/>
                   </a:solidFill>
@@ -1595,7 +1875,7 @@
             </a:ln>
             <a:extLst>
               <a:ext uri="{91240B29-F687-4f45-9708-019B960494DF}">
-                <a14:hiddenLine xmlns:a14="http://schemas.microsoft.com/office/drawing/2010/main" xmlns="" w="9525">
+                <a14:hiddenLine xmlns="" xmlns:a14="http://schemas.microsoft.com/office/drawing/2010/main" w="9525">
                   <a:solidFill>
                     <a:srgbClr val="000000"/>
                   </a:solidFill>
@@ -1657,7 +1937,7 @@
             </a:ln>
             <a:extLst>
               <a:ext uri="{91240B29-F687-4f45-9708-019B960494DF}">
-                <a14:hiddenLine xmlns:a14="http://schemas.microsoft.com/office/drawing/2010/main" xmlns="" w="9525">
+                <a14:hiddenLine xmlns="" xmlns:a14="http://schemas.microsoft.com/office/drawing/2010/main" w="9525">
                   <a:solidFill>
                     <a:srgbClr val="000000"/>
                   </a:solidFill>
@@ -1747,7 +2027,7 @@
             </a:ln>
             <a:extLst>
               <a:ext uri="{91240B29-F687-4f45-9708-019B960494DF}">
-                <a14:hiddenLine xmlns:a14="http://schemas.microsoft.com/office/drawing/2010/main" xmlns="" w="9525">
+                <a14:hiddenLine xmlns="" xmlns:a14="http://schemas.microsoft.com/office/drawing/2010/main" w="9525">
                   <a:solidFill>
                     <a:srgbClr val="000000"/>
                   </a:solidFill>
@@ -1837,7 +2117,7 @@
             </a:ln>
             <a:extLst>
               <a:ext uri="{91240B29-F687-4f45-9708-019B960494DF}">
-                <a14:hiddenLine xmlns:a14="http://schemas.microsoft.com/office/drawing/2010/main" xmlns="" w="9525">
+                <a14:hiddenLine xmlns="" xmlns:a14="http://schemas.microsoft.com/office/drawing/2010/main" w="9525">
                   <a:solidFill>
                     <a:srgbClr val="000000"/>
                   </a:solidFill>
@@ -1899,7 +2179,7 @@
             </a:ln>
             <a:extLst>
               <a:ext uri="{91240B29-F687-4f45-9708-019B960494DF}">
-                <a14:hiddenLine xmlns:a14="http://schemas.microsoft.com/office/drawing/2010/main" xmlns="" w="9525">
+                <a14:hiddenLine xmlns="" xmlns:a14="http://schemas.microsoft.com/office/drawing/2010/main" w="9525">
                   <a:solidFill>
                     <a:srgbClr val="000000"/>
                   </a:solidFill>
@@ -1989,7 +2269,7 @@
             </a:ln>
             <a:extLst>
               <a:ext uri="{91240B29-F687-4f45-9708-019B960494DF}">
-                <a14:hiddenLine xmlns:a14="http://schemas.microsoft.com/office/drawing/2010/main" xmlns="" w="9525">
+                <a14:hiddenLine xmlns="" xmlns:a14="http://schemas.microsoft.com/office/drawing/2010/main" w="9525">
                   <a:solidFill>
                     <a:srgbClr val="000000"/>
                   </a:solidFill>
@@ -2079,7 +2359,7 @@
             </a:ln>
             <a:extLst>
               <a:ext uri="{91240B29-F687-4f45-9708-019B960494DF}">
-                <a14:hiddenLine xmlns:a14="http://schemas.microsoft.com/office/drawing/2010/main" xmlns="" w="9525">
+                <a14:hiddenLine xmlns="" xmlns:a14="http://schemas.microsoft.com/office/drawing/2010/main" w="9525">
                   <a:solidFill>
                     <a:srgbClr val="000000"/>
                   </a:solidFill>
@@ -2135,7 +2415,7 @@
             </a:ln>
             <a:extLst>
               <a:ext uri="{91240B29-F687-4f45-9708-019B960494DF}">
-                <a14:hiddenLine xmlns:a14="http://schemas.microsoft.com/office/drawing/2010/main" xmlns="" w="9525">
+                <a14:hiddenLine xmlns="" xmlns:a14="http://schemas.microsoft.com/office/drawing/2010/main" w="9525">
                   <a:solidFill>
                     <a:srgbClr val="000000"/>
                   </a:solidFill>
@@ -2225,7 +2505,7 @@
             </a:ln>
             <a:extLst>
               <a:ext uri="{91240B29-F687-4f45-9708-019B960494DF}">
-                <a14:hiddenLine xmlns:a14="http://schemas.microsoft.com/office/drawing/2010/main" xmlns="" w="9525">
+                <a14:hiddenLine xmlns="" xmlns:a14="http://schemas.microsoft.com/office/drawing/2010/main" w="9525">
                   <a:solidFill>
                     <a:srgbClr val="000000"/>
                   </a:solidFill>
@@ -2281,7 +2561,7 @@
             </a:ln>
             <a:extLst>
               <a:ext uri="{91240B29-F687-4f45-9708-019B960494DF}">
-                <a14:hiddenLine xmlns:a14="http://schemas.microsoft.com/office/drawing/2010/main" xmlns="" w="9525">
+                <a14:hiddenLine xmlns="" xmlns:a14="http://schemas.microsoft.com/office/drawing/2010/main" w="9525">
                   <a:solidFill>
                     <a:srgbClr val="000000"/>
                   </a:solidFill>
@@ -2371,7 +2651,7 @@
             </a:ln>
             <a:extLst>
               <a:ext uri="{91240B29-F687-4f45-9708-019B960494DF}">
-                <a14:hiddenLine xmlns:a14="http://schemas.microsoft.com/office/drawing/2010/main" xmlns="" w="9525">
+                <a14:hiddenLine xmlns="" xmlns:a14="http://schemas.microsoft.com/office/drawing/2010/main" w="9525">
                   <a:solidFill>
                     <a:srgbClr val="000000"/>
                   </a:solidFill>
@@ -2439,7 +2719,7 @@
             </a:ln>
             <a:extLst>
               <a:ext uri="{91240B29-F687-4f45-9708-019B960494DF}">
-                <a14:hiddenLine xmlns:a14="http://schemas.microsoft.com/office/drawing/2010/main" xmlns="" w="9525">
+                <a14:hiddenLine xmlns="" xmlns:a14="http://schemas.microsoft.com/office/drawing/2010/main" w="9525">
                   <a:solidFill>
                     <a:srgbClr val="000000"/>
                   </a:solidFill>
@@ -2529,7 +2809,7 @@
             </a:ln>
             <a:extLst>
               <a:ext uri="{91240B29-F687-4f45-9708-019B960494DF}">
-                <a14:hiddenLine xmlns:a14="http://schemas.microsoft.com/office/drawing/2010/main" xmlns="" w="9525">
+                <a14:hiddenLine xmlns="" xmlns:a14="http://schemas.microsoft.com/office/drawing/2010/main" w="9525">
                   <a:solidFill>
                     <a:srgbClr val="000000"/>
                   </a:solidFill>
@@ -2597,7 +2877,7 @@
             </a:ln>
             <a:extLst>
               <a:ext uri="{91240B29-F687-4f45-9708-019B960494DF}">
-                <a14:hiddenLine xmlns:a14="http://schemas.microsoft.com/office/drawing/2010/main" xmlns="" w="9525">
+                <a14:hiddenLine xmlns="" xmlns:a14="http://schemas.microsoft.com/office/drawing/2010/main" w="9525">
                   <a:solidFill>
                     <a:srgbClr val="000000"/>
                   </a:solidFill>
@@ -2687,7 +2967,7 @@
             </a:ln>
             <a:extLst>
               <a:ext uri="{91240B29-F687-4f45-9708-019B960494DF}">
-                <a14:hiddenLine xmlns:a14="http://schemas.microsoft.com/office/drawing/2010/main" xmlns="" w="9525">
+                <a14:hiddenLine xmlns="" xmlns:a14="http://schemas.microsoft.com/office/drawing/2010/main" w="9525">
                   <a:solidFill>
                     <a:srgbClr val="000000"/>
                   </a:solidFill>
@@ -2721,7 +3001,7 @@
             </a:ln>
             <a:extLst>
               <a:ext uri="{91240B29-F687-4f45-9708-019B960494DF}">
-                <a14:hiddenLine xmlns:a14="http://schemas.microsoft.com/office/drawing/2010/main" xmlns="" w="9525">
+                <a14:hiddenLine xmlns="" xmlns:a14="http://schemas.microsoft.com/office/drawing/2010/main" w="9525">
                   <a:solidFill>
                     <a:srgbClr val="000000"/>
                   </a:solidFill>
@@ -2811,7 +3091,7 @@
             </a:ln>
             <a:extLst>
               <a:ext uri="{91240B29-F687-4f45-9708-019B960494DF}">
-                <a14:hiddenLine xmlns:a14="http://schemas.microsoft.com/office/drawing/2010/main" xmlns="" w="9525">
+                <a14:hiddenLine xmlns="" xmlns:a14="http://schemas.microsoft.com/office/drawing/2010/main" w="9525">
                   <a:solidFill>
                     <a:srgbClr val="000000"/>
                   </a:solidFill>
@@ -2873,7 +3153,7 @@
             </a:ln>
             <a:extLst>
               <a:ext uri="{91240B29-F687-4f45-9708-019B960494DF}">
-                <a14:hiddenLine xmlns:a14="http://schemas.microsoft.com/office/drawing/2010/main" xmlns="" w="9525">
+                <a14:hiddenLine xmlns="" xmlns:a14="http://schemas.microsoft.com/office/drawing/2010/main" w="9525">
                   <a:solidFill>
                     <a:srgbClr val="000000"/>
                   </a:solidFill>
@@ -2935,7 +3215,7 @@
             </a:ln>
             <a:extLst>
               <a:ext uri="{91240B29-F687-4f45-9708-019B960494DF}">
-                <a14:hiddenLine xmlns:a14="http://schemas.microsoft.com/office/drawing/2010/main" xmlns="" w="9525">
+                <a14:hiddenLine xmlns="" xmlns:a14="http://schemas.microsoft.com/office/drawing/2010/main" w="9525">
                   <a:solidFill>
                     <a:srgbClr val="000000"/>
                   </a:solidFill>
@@ -3025,7 +3305,7 @@
             </a:ln>
             <a:extLst>
               <a:ext uri="{91240B29-F687-4f45-9708-019B960494DF}">
-                <a14:hiddenLine xmlns:a14="http://schemas.microsoft.com/office/drawing/2010/main" xmlns="" w="9525">
+                <a14:hiddenLine xmlns="" xmlns:a14="http://schemas.microsoft.com/office/drawing/2010/main" w="9525">
                   <a:solidFill>
                     <a:srgbClr val="000000"/>
                   </a:solidFill>
@@ -3093,7 +3373,7 @@
             </a:ln>
             <a:extLst>
               <a:ext uri="{91240B29-F687-4f45-9708-019B960494DF}">
-                <a14:hiddenLine xmlns:a14="http://schemas.microsoft.com/office/drawing/2010/main" xmlns="" w="9525">
+                <a14:hiddenLine xmlns="" xmlns:a14="http://schemas.microsoft.com/office/drawing/2010/main" w="9525">
                   <a:solidFill>
                     <a:srgbClr val="000000"/>
                   </a:solidFill>
@@ -3155,7 +3435,7 @@
             </a:ln>
             <a:extLst>
               <a:ext uri="{91240B29-F687-4f45-9708-019B960494DF}">
-                <a14:hiddenLine xmlns:a14="http://schemas.microsoft.com/office/drawing/2010/main" xmlns="" w="9525">
+                <a14:hiddenLine xmlns="" xmlns:a14="http://schemas.microsoft.com/office/drawing/2010/main" w="9525">
                   <a:solidFill>
                     <a:srgbClr val="000000"/>
                   </a:solidFill>
@@ -3245,7 +3525,7 @@
             </a:ln>
             <a:extLst>
               <a:ext uri="{91240B29-F687-4f45-9708-019B960494DF}">
-                <a14:hiddenLine xmlns:a14="http://schemas.microsoft.com/office/drawing/2010/main" xmlns="" w="9525">
+                <a14:hiddenLine xmlns="" xmlns:a14="http://schemas.microsoft.com/office/drawing/2010/main" w="9525">
                   <a:solidFill>
                     <a:srgbClr val="000000"/>
                   </a:solidFill>
@@ -3307,7 +3587,7 @@
             </a:ln>
             <a:extLst>
               <a:ext uri="{91240B29-F687-4f45-9708-019B960494DF}">
-                <a14:hiddenLine xmlns:a14="http://schemas.microsoft.com/office/drawing/2010/main" xmlns="" w="9525">
+                <a14:hiddenLine xmlns="" xmlns:a14="http://schemas.microsoft.com/office/drawing/2010/main" w="9525">
                   <a:solidFill>
                     <a:srgbClr val="000000"/>
                   </a:solidFill>
@@ -3397,7 +3677,7 @@
             </a:ln>
             <a:extLst>
               <a:ext uri="{91240B29-F687-4f45-9708-019B960494DF}">
-                <a14:hiddenLine xmlns:a14="http://schemas.microsoft.com/office/drawing/2010/main" xmlns="" w="9525">
+                <a14:hiddenLine xmlns="" xmlns:a14="http://schemas.microsoft.com/office/drawing/2010/main" w="9525">
                   <a:solidFill>
                     <a:srgbClr val="000000"/>
                   </a:solidFill>
@@ -3459,7 +3739,7 @@
             </a:ln>
             <a:extLst>
               <a:ext uri="{91240B29-F687-4f45-9708-019B960494DF}">
-                <a14:hiddenLine xmlns:a14="http://schemas.microsoft.com/office/drawing/2010/main" xmlns="" w="9525">
+                <a14:hiddenLine xmlns="" xmlns:a14="http://schemas.microsoft.com/office/drawing/2010/main" w="9525">
                   <a:solidFill>
                     <a:srgbClr val="000000"/>
                   </a:solidFill>
@@ -3549,7 +3829,7 @@
             </a:ln>
             <a:extLst>
               <a:ext uri="{91240B29-F687-4f45-9708-019B960494DF}">
-                <a14:hiddenLine xmlns:a14="http://schemas.microsoft.com/office/drawing/2010/main" xmlns="" w="9525">
+                <a14:hiddenLine xmlns="" xmlns:a14="http://schemas.microsoft.com/office/drawing/2010/main" w="9525">
                   <a:solidFill>
                     <a:srgbClr val="000000"/>
                   </a:solidFill>
@@ -3583,7 +3863,7 @@
             </a:ln>
             <a:extLst>
               <a:ext uri="{91240B29-F687-4f45-9708-019B960494DF}">
-                <a14:hiddenLine xmlns:a14="http://schemas.microsoft.com/office/drawing/2010/main" xmlns="" w="9525">
+                <a14:hiddenLine xmlns="" xmlns:a14="http://schemas.microsoft.com/office/drawing/2010/main" w="9525">
                   <a:solidFill>
                     <a:srgbClr val="000000"/>
                   </a:solidFill>
@@ -3648,7 +3928,7 @@
             </a:ln>
             <a:extLst>
               <a:ext uri="{91240B29-F687-4f45-9708-019B960494DF}">
-                <a14:hiddenLine xmlns:a14="http://schemas.microsoft.com/office/drawing/2010/main" xmlns="" w="9525">
+                <a14:hiddenLine xmlns="" xmlns:a14="http://schemas.microsoft.com/office/drawing/2010/main" w="9525">
                   <a:solidFill>
                     <a:srgbClr val="000000"/>
                   </a:solidFill>
@@ -3738,7 +4018,7 @@
             </a:ln>
             <a:extLst>
               <a:ext uri="{91240B29-F687-4f45-9708-019B960494DF}">
-                <a14:hiddenLine xmlns:a14="http://schemas.microsoft.com/office/drawing/2010/main" xmlns="" w="9525">
+                <a14:hiddenLine xmlns="" xmlns:a14="http://schemas.microsoft.com/office/drawing/2010/main" w="9525">
                   <a:solidFill>
                     <a:srgbClr val="000000"/>
                   </a:solidFill>
@@ -3800,7 +4080,7 @@
             </a:ln>
             <a:extLst>
               <a:ext uri="{91240B29-F687-4f45-9708-019B960494DF}">
-                <a14:hiddenLine xmlns:a14="http://schemas.microsoft.com/office/drawing/2010/main" xmlns="" w="9525">
+                <a14:hiddenLine xmlns="" xmlns:a14="http://schemas.microsoft.com/office/drawing/2010/main" w="9525">
                   <a:solidFill>
                     <a:srgbClr val="000000"/>
                   </a:solidFill>
@@ -3890,7 +4170,7 @@
             </a:ln>
             <a:extLst>
               <a:ext uri="{91240B29-F687-4f45-9708-019B960494DF}">
-                <a14:hiddenLine xmlns:a14="http://schemas.microsoft.com/office/drawing/2010/main" xmlns="" w="9525">
+                <a14:hiddenLine xmlns="" xmlns:a14="http://schemas.microsoft.com/office/drawing/2010/main" w="9525">
                   <a:solidFill>
                     <a:srgbClr val="000000"/>
                   </a:solidFill>
@@ -3980,7 +4260,7 @@
             </a:ln>
             <a:extLst>
               <a:ext uri="{91240B29-F687-4f45-9708-019B960494DF}">
-                <a14:hiddenLine xmlns:a14="http://schemas.microsoft.com/office/drawing/2010/main" xmlns="" w="9525">
+                <a14:hiddenLine xmlns="" xmlns:a14="http://schemas.microsoft.com/office/drawing/2010/main" w="9525">
                   <a:solidFill>
                     <a:srgbClr val="000000"/>
                   </a:solidFill>
@@ -4045,7 +4325,7 @@
             </a:ln>
             <a:extLst>
               <a:ext uri="{91240B29-F687-4f45-9708-019B960494DF}">
-                <a14:hiddenLine xmlns:a14="http://schemas.microsoft.com/office/drawing/2010/main" xmlns="" w="9525">
+                <a14:hiddenLine xmlns="" xmlns:a14="http://schemas.microsoft.com/office/drawing/2010/main" w="9525">
                   <a:solidFill>
                     <a:srgbClr val="000000"/>
                   </a:solidFill>
@@ -4107,7 +4387,7 @@
             </a:ln>
             <a:extLst>
               <a:ext uri="{91240B29-F687-4f45-9708-019B960494DF}">
-                <a14:hiddenLine xmlns:a14="http://schemas.microsoft.com/office/drawing/2010/main" xmlns="" w="9525">
+                <a14:hiddenLine xmlns="" xmlns:a14="http://schemas.microsoft.com/office/drawing/2010/main" w="9525">
                   <a:solidFill>
                     <a:srgbClr val="000000"/>
                   </a:solidFill>
@@ -4197,7 +4477,7 @@
             </a:ln>
             <a:extLst>
               <a:ext uri="{91240B29-F687-4f45-9708-019B960494DF}">
-                <a14:hiddenLine xmlns:a14="http://schemas.microsoft.com/office/drawing/2010/main" xmlns="" w="9525">
+                <a14:hiddenLine xmlns="" xmlns:a14="http://schemas.microsoft.com/office/drawing/2010/main" w="9525">
                   <a:solidFill>
                     <a:srgbClr val="000000"/>
                   </a:solidFill>
@@ -4287,7 +4567,7 @@
             </a:ln>
             <a:extLst>
               <a:ext uri="{91240B29-F687-4f45-9708-019B960494DF}">
-                <a14:hiddenLine xmlns:a14="http://schemas.microsoft.com/office/drawing/2010/main" xmlns="" w="9525">
+                <a14:hiddenLine xmlns="" xmlns:a14="http://schemas.microsoft.com/office/drawing/2010/main" w="9525">
                   <a:solidFill>
                     <a:srgbClr val="000000"/>
                   </a:solidFill>
@@ -4349,7 +4629,7 @@
             </a:ln>
             <a:extLst>
               <a:ext uri="{91240B29-F687-4f45-9708-019B960494DF}">
-                <a14:hiddenLine xmlns:a14="http://schemas.microsoft.com/office/drawing/2010/main" xmlns="" w="9525">
+                <a14:hiddenLine xmlns="" xmlns:a14="http://schemas.microsoft.com/office/drawing/2010/main" w="9525">
                   <a:solidFill>
                     <a:srgbClr val="000000"/>
                   </a:solidFill>
@@ -4469,7 +4749,7 @@
             </a:ln>
             <a:extLst>
               <a:ext uri="{91240B29-F687-4f45-9708-019B960494DF}">
-                <a14:hiddenLine xmlns:a14="http://schemas.microsoft.com/office/drawing/2010/main" xmlns="" w="9525">
+                <a14:hiddenLine xmlns="" xmlns:a14="http://schemas.microsoft.com/office/drawing/2010/main" w="9525">
                   <a:solidFill>
                     <a:srgbClr val="000000"/>
                   </a:solidFill>
@@ -4537,7 +4817,7 @@
             </a:ln>
             <a:extLst>
               <a:ext uri="{91240B29-F687-4f45-9708-019B960494DF}">
-                <a14:hiddenLine xmlns:a14="http://schemas.microsoft.com/office/drawing/2010/main" xmlns="" w="9525">
+                <a14:hiddenLine xmlns="" xmlns:a14="http://schemas.microsoft.com/office/drawing/2010/main" w="9525">
                   <a:solidFill>
                     <a:srgbClr val="000000"/>
                   </a:solidFill>
@@ -4627,7 +4907,7 @@
             </a:ln>
             <a:extLst>
               <a:ext uri="{91240B29-F687-4f45-9708-019B960494DF}">
-                <a14:hiddenLine xmlns:a14="http://schemas.microsoft.com/office/drawing/2010/main" xmlns="" w="9525">
+                <a14:hiddenLine xmlns="" xmlns:a14="http://schemas.microsoft.com/office/drawing/2010/main" w="9525">
                   <a:solidFill>
                     <a:srgbClr val="000000"/>
                   </a:solidFill>
@@ -10298,7 +10578,7 @@
           <a:noFill/>
           <a:extLst>
             <a:ext uri="{909E8E84-426E-40dd-AFC4-6F175D3DCCD1}">
-              <a14:hiddenFill xmlns:a14="http://schemas.microsoft.com/office/drawing/2010/main" xmlns="">
+              <a14:hiddenFill xmlns="" xmlns:a14="http://schemas.microsoft.com/office/drawing/2010/main">
                 <a:solidFill>
                   <a:srgbClr val="FFFFFF"/>
                 </a:solidFill>
@@ -10372,7 +10652,7 @@
               </a:ln>
               <a:extLst>
                 <a:ext uri="{91240B29-F687-4f45-9708-019B960494DF}">
-                  <a14:hiddenLine xmlns:a14="http://schemas.microsoft.com/office/drawing/2010/main" xmlns="" w="9525">
+                  <a14:hiddenLine xmlns="" xmlns:a14="http://schemas.microsoft.com/office/drawing/2010/main" w="9525">
                     <a:solidFill>
                       <a:srgbClr val="000000"/>
                     </a:solidFill>
@@ -10462,7 +10742,7 @@
               </a:ln>
               <a:extLst>
                 <a:ext uri="{91240B29-F687-4f45-9708-019B960494DF}">
-                  <a14:hiddenLine xmlns:a14="http://schemas.microsoft.com/office/drawing/2010/main" xmlns="" w="9525">
+                  <a14:hiddenLine xmlns="" xmlns:a14="http://schemas.microsoft.com/office/drawing/2010/main" w="9525">
                     <a:solidFill>
                       <a:srgbClr val="000000"/>
                     </a:solidFill>
@@ -10552,7 +10832,7 @@
               </a:ln>
               <a:extLst>
                 <a:ext uri="{91240B29-F687-4f45-9708-019B960494DF}">
-                  <a14:hiddenLine xmlns:a14="http://schemas.microsoft.com/office/drawing/2010/main" xmlns="" w="9525">
+                  <a14:hiddenLine xmlns="" xmlns:a14="http://schemas.microsoft.com/office/drawing/2010/main" w="9525">
                     <a:solidFill>
                       <a:srgbClr val="000000"/>
                     </a:solidFill>
@@ -10614,7 +10894,7 @@
               </a:ln>
               <a:extLst>
                 <a:ext uri="{91240B29-F687-4f45-9708-019B960494DF}">
-                  <a14:hiddenLine xmlns:a14="http://schemas.microsoft.com/office/drawing/2010/main" xmlns="" w="9525">
+                  <a14:hiddenLine xmlns="" xmlns:a14="http://schemas.microsoft.com/office/drawing/2010/main" w="9525">
                     <a:solidFill>
                       <a:srgbClr val="000000"/>
                     </a:solidFill>
@@ -10704,7 +10984,7 @@
               </a:ln>
               <a:extLst>
                 <a:ext uri="{91240B29-F687-4f45-9708-019B960494DF}">
-                  <a14:hiddenLine xmlns:a14="http://schemas.microsoft.com/office/drawing/2010/main" xmlns="" w="9525">
+                  <a14:hiddenLine xmlns="" xmlns:a14="http://schemas.microsoft.com/office/drawing/2010/main" w="9525">
                     <a:solidFill>
                       <a:srgbClr val="000000"/>
                     </a:solidFill>
@@ -10766,7 +11046,7 @@
               </a:ln>
               <a:extLst>
                 <a:ext uri="{91240B29-F687-4f45-9708-019B960494DF}">
-                  <a14:hiddenLine xmlns:a14="http://schemas.microsoft.com/office/drawing/2010/main" xmlns="" w="9525">
+                  <a14:hiddenLine xmlns="" xmlns:a14="http://schemas.microsoft.com/office/drawing/2010/main" w="9525">
                     <a:solidFill>
                       <a:srgbClr val="000000"/>
                     </a:solidFill>
@@ -10828,7 +11108,7 @@
               </a:ln>
               <a:extLst>
                 <a:ext uri="{91240B29-F687-4f45-9708-019B960494DF}">
-                  <a14:hiddenLine xmlns:a14="http://schemas.microsoft.com/office/drawing/2010/main" xmlns="" w="9525">
+                  <a14:hiddenLine xmlns="" xmlns:a14="http://schemas.microsoft.com/office/drawing/2010/main" w="9525">
                     <a:solidFill>
                       <a:srgbClr val="000000"/>
                     </a:solidFill>
@@ -10918,7 +11198,7 @@
               </a:ln>
               <a:extLst>
                 <a:ext uri="{91240B29-F687-4f45-9708-019B960494DF}">
-                  <a14:hiddenLine xmlns:a14="http://schemas.microsoft.com/office/drawing/2010/main" xmlns="" w="9525">
+                  <a14:hiddenLine xmlns="" xmlns:a14="http://schemas.microsoft.com/office/drawing/2010/main" w="9525">
                     <a:solidFill>
                       <a:srgbClr val="000000"/>
                     </a:solidFill>
@@ -11008,7 +11288,7 @@
               </a:ln>
               <a:extLst>
                 <a:ext uri="{91240B29-F687-4f45-9708-019B960494DF}">
-                  <a14:hiddenLine xmlns:a14="http://schemas.microsoft.com/office/drawing/2010/main" xmlns="" w="9525">
+                  <a14:hiddenLine xmlns="" xmlns:a14="http://schemas.microsoft.com/office/drawing/2010/main" w="9525">
                     <a:solidFill>
                       <a:srgbClr val="000000"/>
                     </a:solidFill>
@@ -11070,7 +11350,7 @@
               </a:ln>
               <a:extLst>
                 <a:ext uri="{91240B29-F687-4f45-9708-019B960494DF}">
-                  <a14:hiddenLine xmlns:a14="http://schemas.microsoft.com/office/drawing/2010/main" xmlns="" w="9525">
+                  <a14:hiddenLine xmlns="" xmlns:a14="http://schemas.microsoft.com/office/drawing/2010/main" w="9525">
                     <a:solidFill>
                       <a:srgbClr val="000000"/>
                     </a:solidFill>
@@ -11180,7 +11460,7 @@
               </a:ln>
               <a:extLst>
                 <a:ext uri="{91240B29-F687-4f45-9708-019B960494DF}">
-                  <a14:hiddenLine xmlns:a14="http://schemas.microsoft.com/office/drawing/2010/main" xmlns="" w="9525">
+                  <a14:hiddenLine xmlns="" xmlns:a14="http://schemas.microsoft.com/office/drawing/2010/main" w="9525">
                     <a:solidFill>
                       <a:srgbClr val="000000"/>
                     </a:solidFill>
@@ -11264,7 +11544,7 @@
               </a:ln>
               <a:extLst>
                 <a:ext uri="{91240B29-F687-4f45-9708-019B960494DF}">
-                  <a14:hiddenLine xmlns:a14="http://schemas.microsoft.com/office/drawing/2010/main" xmlns="" w="9525">
+                  <a14:hiddenLine xmlns="" xmlns:a14="http://schemas.microsoft.com/office/drawing/2010/main" w="9525">
                     <a:solidFill>
                       <a:srgbClr val="000000"/>
                     </a:solidFill>
@@ -11326,7 +11606,7 @@
               </a:ln>
               <a:extLst>
                 <a:ext uri="{91240B29-F687-4f45-9708-019B960494DF}">
-                  <a14:hiddenLine xmlns:a14="http://schemas.microsoft.com/office/drawing/2010/main" xmlns="" w="9525">
+                  <a14:hiddenLine xmlns="" xmlns:a14="http://schemas.microsoft.com/office/drawing/2010/main" w="9525">
                     <a:solidFill>
                       <a:srgbClr val="000000"/>
                     </a:solidFill>
@@ -11388,7 +11668,7 @@
               </a:ln>
               <a:extLst>
                 <a:ext uri="{91240B29-F687-4f45-9708-019B960494DF}">
-                  <a14:hiddenLine xmlns:a14="http://schemas.microsoft.com/office/drawing/2010/main" xmlns="" w="9525">
+                  <a14:hiddenLine xmlns="" xmlns:a14="http://schemas.microsoft.com/office/drawing/2010/main" w="9525">
                     <a:solidFill>
                       <a:srgbClr val="000000"/>
                     </a:solidFill>
@@ -11478,7 +11758,7 @@
               </a:ln>
               <a:extLst>
                 <a:ext uri="{91240B29-F687-4f45-9708-019B960494DF}">
-                  <a14:hiddenLine xmlns:a14="http://schemas.microsoft.com/office/drawing/2010/main" xmlns="" w="9525">
+                  <a14:hiddenLine xmlns="" xmlns:a14="http://schemas.microsoft.com/office/drawing/2010/main" w="9525">
                     <a:solidFill>
                       <a:srgbClr val="000000"/>
                     </a:solidFill>
@@ -11512,7 +11792,7 @@
               </a:ln>
               <a:extLst>
                 <a:ext uri="{91240B29-F687-4f45-9708-019B960494DF}">
-                  <a14:hiddenLine xmlns:a14="http://schemas.microsoft.com/office/drawing/2010/main" xmlns="" w="9525">
+                  <a14:hiddenLine xmlns="" xmlns:a14="http://schemas.microsoft.com/office/drawing/2010/main" w="9525">
                     <a:solidFill>
                       <a:srgbClr val="000000"/>
                     </a:solidFill>
@@ -11577,7 +11857,7 @@
               </a:ln>
               <a:extLst>
                 <a:ext uri="{91240B29-F687-4f45-9708-019B960494DF}">
-                  <a14:hiddenLine xmlns:a14="http://schemas.microsoft.com/office/drawing/2010/main" xmlns="" w="9525">
+                  <a14:hiddenLine xmlns="" xmlns:a14="http://schemas.microsoft.com/office/drawing/2010/main" w="9525">
                     <a:solidFill>
                       <a:srgbClr val="000000"/>
                     </a:solidFill>
@@ -11667,7 +11947,7 @@
               </a:ln>
               <a:extLst>
                 <a:ext uri="{91240B29-F687-4f45-9708-019B960494DF}">
-                  <a14:hiddenLine xmlns:a14="http://schemas.microsoft.com/office/drawing/2010/main" xmlns="" w="9525">
+                  <a14:hiddenLine xmlns="" xmlns:a14="http://schemas.microsoft.com/office/drawing/2010/main" w="9525">
                     <a:solidFill>
                       <a:srgbClr val="000000"/>
                     </a:solidFill>
@@ -11729,7 +12009,7 @@
               </a:ln>
               <a:extLst>
                 <a:ext uri="{91240B29-F687-4f45-9708-019B960494DF}">
-                  <a14:hiddenLine xmlns:a14="http://schemas.microsoft.com/office/drawing/2010/main" xmlns="" w="9525">
+                  <a14:hiddenLine xmlns="" xmlns:a14="http://schemas.microsoft.com/office/drawing/2010/main" w="9525">
                     <a:solidFill>
                       <a:srgbClr val="000000"/>
                     </a:solidFill>
@@ -11819,7 +12099,7 @@
               </a:ln>
               <a:extLst>
                 <a:ext uri="{91240B29-F687-4f45-9708-019B960494DF}">
-                  <a14:hiddenLine xmlns:a14="http://schemas.microsoft.com/office/drawing/2010/main" xmlns="" w="9525">
+                  <a14:hiddenLine xmlns="" xmlns:a14="http://schemas.microsoft.com/office/drawing/2010/main" w="9525">
                     <a:solidFill>
                       <a:srgbClr val="000000"/>
                     </a:solidFill>
@@ -11884,7 +12164,7 @@
               </a:ln>
               <a:extLst>
                 <a:ext uri="{91240B29-F687-4f45-9708-019B960494DF}">
-                  <a14:hiddenLine xmlns:a14="http://schemas.microsoft.com/office/drawing/2010/main" xmlns="" w="9525">
+                  <a14:hiddenLine xmlns="" xmlns:a14="http://schemas.microsoft.com/office/drawing/2010/main" w="9525">
                     <a:solidFill>
                       <a:srgbClr val="000000"/>
                     </a:solidFill>
@@ -11946,7 +12226,7 @@
               </a:ln>
               <a:extLst>
                 <a:ext uri="{91240B29-F687-4f45-9708-019B960494DF}">
-                  <a14:hiddenLine xmlns:a14="http://schemas.microsoft.com/office/drawing/2010/main" xmlns="" w="9525">
+                  <a14:hiddenLine xmlns="" xmlns:a14="http://schemas.microsoft.com/office/drawing/2010/main" w="9525">
                     <a:solidFill>
                       <a:srgbClr val="000000"/>
                     </a:solidFill>
@@ -12036,7 +12316,7 @@
               </a:ln>
               <a:extLst>
                 <a:ext uri="{91240B29-F687-4f45-9708-019B960494DF}">
-                  <a14:hiddenLine xmlns:a14="http://schemas.microsoft.com/office/drawing/2010/main" xmlns="" w="9525">
+                  <a14:hiddenLine xmlns="" xmlns:a14="http://schemas.microsoft.com/office/drawing/2010/main" w="9525">
                     <a:solidFill>
                       <a:srgbClr val="000000"/>
                     </a:solidFill>
@@ -12126,7 +12406,7 @@
               </a:ln>
               <a:extLst>
                 <a:ext uri="{91240B29-F687-4f45-9708-019B960494DF}">
-                  <a14:hiddenLine xmlns:a14="http://schemas.microsoft.com/office/drawing/2010/main" xmlns="" w="9525">
+                  <a14:hiddenLine xmlns="" xmlns:a14="http://schemas.microsoft.com/office/drawing/2010/main" w="9525">
                     <a:solidFill>
                       <a:srgbClr val="000000"/>
                     </a:solidFill>
@@ -12191,7 +12471,7 @@
               </a:ln>
               <a:extLst>
                 <a:ext uri="{91240B29-F687-4f45-9708-019B960494DF}">
-                  <a14:hiddenLine xmlns:a14="http://schemas.microsoft.com/office/drawing/2010/main" xmlns="" w="9525">
+                  <a14:hiddenLine xmlns="" xmlns:a14="http://schemas.microsoft.com/office/drawing/2010/main" w="9525">
                     <a:solidFill>
                       <a:srgbClr val="000000"/>
                     </a:solidFill>
@@ -12311,7 +12591,7 @@
               </a:ln>
               <a:extLst>
                 <a:ext uri="{91240B29-F687-4f45-9708-019B960494DF}">
-                  <a14:hiddenLine xmlns:a14="http://schemas.microsoft.com/office/drawing/2010/main" xmlns="" w="9525">
+                  <a14:hiddenLine xmlns="" xmlns:a14="http://schemas.microsoft.com/office/drawing/2010/main" w="9525">
                     <a:solidFill>
                       <a:srgbClr val="000000"/>
                     </a:solidFill>
@@ -12409,7 +12689,7 @@
               </a:ln>
               <a:extLst>
                 <a:ext uri="{91240B29-F687-4f45-9708-019B960494DF}">
-                  <a14:hiddenLine xmlns:a14="http://schemas.microsoft.com/office/drawing/2010/main" xmlns="" w="9525">
+                  <a14:hiddenLine xmlns="" xmlns:a14="http://schemas.microsoft.com/office/drawing/2010/main" w="9525">
                     <a:solidFill>
                       <a:srgbClr val="000000"/>
                     </a:solidFill>
@@ -12524,7 +12804,7 @@
               </a:ln>
               <a:extLst>
                 <a:ext uri="{91240B29-F687-4f45-9708-019B960494DF}">
-                  <a14:hiddenLine xmlns:a14="http://schemas.microsoft.com/office/drawing/2010/main" xmlns="" w="9525">
+                  <a14:hiddenLine xmlns="" xmlns:a14="http://schemas.microsoft.com/office/drawing/2010/main" w="9525">
                     <a:solidFill>
                       <a:srgbClr val="000000"/>
                     </a:solidFill>
@@ -12614,7 +12894,7 @@
               </a:ln>
               <a:extLst>
                 <a:ext uri="{91240B29-F687-4f45-9708-019B960494DF}">
-                  <a14:hiddenLine xmlns:a14="http://schemas.microsoft.com/office/drawing/2010/main" xmlns="" w="9525">
+                  <a14:hiddenLine xmlns="" xmlns:a14="http://schemas.microsoft.com/office/drawing/2010/main" w="9525">
                     <a:solidFill>
                       <a:srgbClr val="000000"/>
                     </a:solidFill>
@@ -12679,7 +12959,7 @@
               </a:ln>
               <a:extLst>
                 <a:ext uri="{91240B29-F687-4f45-9708-019B960494DF}">
-                  <a14:hiddenLine xmlns:a14="http://schemas.microsoft.com/office/drawing/2010/main" xmlns="" w="9525">
+                  <a14:hiddenLine xmlns="" xmlns:a14="http://schemas.microsoft.com/office/drawing/2010/main" w="9525">
                     <a:solidFill>
                       <a:srgbClr val="000000"/>
                     </a:solidFill>
@@ -12769,7 +13049,7 @@
               </a:ln>
               <a:extLst>
                 <a:ext uri="{91240B29-F687-4f45-9708-019B960494DF}">
-                  <a14:hiddenLine xmlns:a14="http://schemas.microsoft.com/office/drawing/2010/main" xmlns="" w="9525">
+                  <a14:hiddenLine xmlns="" xmlns:a14="http://schemas.microsoft.com/office/drawing/2010/main" w="9525">
                     <a:solidFill>
                       <a:srgbClr val="000000"/>
                     </a:solidFill>
@@ -12837,7 +13117,7 @@
               </a:ln>
               <a:extLst>
                 <a:ext uri="{91240B29-F687-4f45-9708-019B960494DF}">
-                  <a14:hiddenLine xmlns:a14="http://schemas.microsoft.com/office/drawing/2010/main" xmlns="" w="9525">
+                  <a14:hiddenLine xmlns="" xmlns:a14="http://schemas.microsoft.com/office/drawing/2010/main" w="9525">
                     <a:solidFill>
                       <a:srgbClr val="000000"/>
                     </a:solidFill>
@@ -12927,7 +13207,7 @@
               </a:ln>
               <a:extLst>
                 <a:ext uri="{91240B29-F687-4f45-9708-019B960494DF}">
-                  <a14:hiddenLine xmlns:a14="http://schemas.microsoft.com/office/drawing/2010/main" xmlns="" w="9525">
+                  <a14:hiddenLine xmlns="" xmlns:a14="http://schemas.microsoft.com/office/drawing/2010/main" w="9525">
                     <a:solidFill>
                       <a:srgbClr val="000000"/>
                     </a:solidFill>
@@ -12995,7 +13275,7 @@
               </a:ln>
               <a:extLst>
                 <a:ext uri="{91240B29-F687-4f45-9708-019B960494DF}">
-                  <a14:hiddenLine xmlns:a14="http://schemas.microsoft.com/office/drawing/2010/main" xmlns="" w="9525">
+                  <a14:hiddenLine xmlns="" xmlns:a14="http://schemas.microsoft.com/office/drawing/2010/main" w="9525">
                     <a:solidFill>
                       <a:srgbClr val="000000"/>
                     </a:solidFill>
@@ -13085,7 +13365,7 @@
               </a:ln>
               <a:extLst>
                 <a:ext uri="{91240B29-F687-4f45-9708-019B960494DF}">
-                  <a14:hiddenLine xmlns:a14="http://schemas.microsoft.com/office/drawing/2010/main" xmlns="" w="9525">
+                  <a14:hiddenLine xmlns="" xmlns:a14="http://schemas.microsoft.com/office/drawing/2010/main" w="9525">
                     <a:solidFill>
                       <a:srgbClr val="000000"/>
                     </a:solidFill>
@@ -13119,7 +13399,7 @@
               </a:ln>
               <a:extLst>
                 <a:ext uri="{91240B29-F687-4f45-9708-019B960494DF}">
-                  <a14:hiddenLine xmlns:a14="http://schemas.microsoft.com/office/drawing/2010/main" xmlns="" w="9525">
+                  <a14:hiddenLine xmlns="" xmlns:a14="http://schemas.microsoft.com/office/drawing/2010/main" w="9525">
                     <a:solidFill>
                       <a:srgbClr val="000000"/>
                     </a:solidFill>
@@ -13724,11 +14004,11 @@
             <a:r>
               <a:rPr dirty="0">
                 <a:effectLst>
-                  <a:outerShdw blurRad="38100" dist="38100" dir="2700000" algn="tl">
-                    <a:srgbClr val="000000">
-                      <a:alpha val="43137"/>
-                    </a:srgbClr>
-                  </a:outerShdw>
+                  <a:innerShdw blurRad="63500" dist="50800" dir="13500000">
+                    <a:schemeClr val="bg1">
+                      <a:alpha val="50000"/>
+                    </a:schemeClr>
+                  </a:innerShdw>
                 </a:effectLst>
               </a:rPr>
               <a:t>Covid-19 Ethnicity Analysis - Southeast Region</a:t>
@@ -13755,7 +14035,7 @@
           </a:ln>
           <a:extLst>
             <a:ext uri="{C572A759-6A51-4108-AA02-DFA0A04FC94B}">
-              <ma14:wrappingTextBoxFlag xmlns:ma14="http://schemas.microsoft.com/office/mac/drawingml/2011/main" xmlns:a14="http://schemas.microsoft.com/office/drawing/2010/main" xmlns:m="http://schemas.openxmlformats.org/officeDocument/2006/math" xmlns="" val="1"/>
+              <ma14:wrappingTextBoxFlag xmlns="" xmlns:m="http://schemas.openxmlformats.org/officeDocument/2006/math" xmlns:a14="http://schemas.microsoft.com/office/drawing/2010/main" xmlns:ma14="http://schemas.microsoft.com/office/mac/drawingml/2011/main" val="1"/>
             </a:ext>
           </a:extLst>
         </p:spPr>
@@ -13938,31 +14218,100 @@
       </p:grpSpPr>
       <p:pic>
         <p:nvPicPr>
-          <p:cNvPr id="315" name="Screen Shot 2021-04-13 at 12.10.50 AM.png" descr="Screen Shot 2021-04-13 at 12.10.50 AM.png"/>
+          <p:cNvPr id="15" name="Picture 14" descr="Chart, bar chart&#10;&#10;Description automatically generated">
+            <a:extLst>
+              <a:ext uri="{FF2B5EF4-FFF2-40B4-BE49-F238E27FC236}">
+                <a16:creationId xmlns:a16="http://schemas.microsoft.com/office/drawing/2014/main" id="{AFA02275-8121-414E-BF5D-E68354D067B0}"/>
+              </a:ext>
+            </a:extLst>
+          </p:cNvPr>
           <p:cNvPicPr>
             <a:picLocks noChangeAspect="1"/>
           </p:cNvPicPr>
           <p:nvPr/>
         </p:nvPicPr>
-        <p:blipFill rotWithShape="1">
+        <p:blipFill>
           <a:blip r:embed="rId2"/>
-          <a:srcRect l="1040" t="2782" r="2289" b="3607"/>
-          <a:stretch/>
+          <a:stretch>
+            <a:fillRect/>
+          </a:stretch>
         </p:blipFill>
         <p:spPr>
           <a:xfrm>
-            <a:off x="799253" y="202940"/>
-            <a:ext cx="7423574" cy="4595119"/>
+            <a:off x="3360235" y="2791794"/>
+            <a:ext cx="5783765" cy="2351706"/>
           </a:xfrm>
           <a:prstGeom prst="rect">
             <a:avLst/>
           </a:prstGeom>
-          <a:ln w="12700">
-            <a:miter lim="400000"/>
-          </a:ln>
+        </p:spPr>
+      </p:pic>
+      <p:pic>
+        <p:nvPicPr>
+          <p:cNvPr id="6" name="Picture 5" descr="Table&#10;&#10;Description automatically generated">
+            <a:extLst>
+              <a:ext uri="{FF2B5EF4-FFF2-40B4-BE49-F238E27FC236}">
+                <a16:creationId xmlns:a16="http://schemas.microsoft.com/office/drawing/2014/main" id="{B5DEC9C2-CE5F-41E0-89C8-48F546FB110D}"/>
+              </a:ext>
+            </a:extLst>
+          </p:cNvPr>
+          <p:cNvPicPr>
+            <a:picLocks noChangeAspect="1"/>
+          </p:cNvPicPr>
+          <p:nvPr/>
+        </p:nvPicPr>
+        <p:blipFill>
+          <a:blip r:embed="rId3"/>
+          <a:stretch>
+            <a:fillRect/>
+          </a:stretch>
+        </p:blipFill>
+        <p:spPr>
+          <a:xfrm>
+            <a:off x="0" y="0"/>
+            <a:ext cx="3343864" cy="5143500"/>
+          </a:xfrm>
+          <a:prstGeom prst="rect">
+            <a:avLst/>
+          </a:prstGeom>
+        </p:spPr>
+      </p:pic>
+      <p:pic>
+        <p:nvPicPr>
+          <p:cNvPr id="9" name="Picture 8" descr="Table&#10;&#10;Description automatically generated">
+            <a:extLst>
+              <a:ext uri="{FF2B5EF4-FFF2-40B4-BE49-F238E27FC236}">
+                <a16:creationId xmlns:a16="http://schemas.microsoft.com/office/drawing/2014/main" id="{17E5510B-580D-48F2-9BAF-39F3BD7B2FF1}"/>
+              </a:ext>
+            </a:extLst>
+          </p:cNvPr>
+          <p:cNvPicPr>
+            <a:picLocks noChangeAspect="1"/>
+          </p:cNvPicPr>
+          <p:nvPr/>
+        </p:nvPicPr>
+        <p:blipFill>
+          <a:blip r:embed="rId4"/>
+          <a:stretch>
+            <a:fillRect/>
+          </a:stretch>
+        </p:blipFill>
+        <p:spPr>
+          <a:xfrm>
+            <a:off x="3360235" y="0"/>
+            <a:ext cx="5783766" cy="2771326"/>
+          </a:xfrm>
+          <a:prstGeom prst="rect">
+            <a:avLst/>
+          </a:prstGeom>
         </p:spPr>
       </p:pic>
     </p:spTree>
+    <p:extLst>
+      <p:ext uri="{BB962C8B-B14F-4D97-AF65-F5344CB8AC3E}">
+        <p14:creationId xmlns:p14="http://schemas.microsoft.com/office/powerpoint/2010/main" val="4135915655"/>
+      </p:ext>
+    </p:extLst>
   </p:cSld>
   <p:clrMapOvr>
     <a:masterClrMapping/>
@@ -14001,6 +14350,116 @@
       </p:grpSpPr>
       <p:pic>
         <p:nvPicPr>
+          <p:cNvPr id="315" name="Screen Shot 2021-04-13 at 12.10.50 AM.png" descr="Screen Shot 2021-04-13 at 12.10.50 AM.png"/>
+          <p:cNvPicPr>
+            <a:picLocks noChangeAspect="1"/>
+          </p:cNvPicPr>
+          <p:nvPr/>
+        </p:nvPicPr>
+        <p:blipFill rotWithShape="1">
+          <a:blip r:embed="rId2"/>
+          <a:srcRect l="1040" t="2782" r="2289" b="3607"/>
+          <a:stretch/>
+        </p:blipFill>
+        <p:spPr>
+          <a:xfrm>
+            <a:off x="1340528" y="841948"/>
+            <a:ext cx="6462944" cy="4000499"/>
+          </a:xfrm>
+          <a:prstGeom prst="rect">
+            <a:avLst/>
+          </a:prstGeom>
+          <a:ln w="12700">
+            <a:miter lim="400000"/>
+          </a:ln>
+        </p:spPr>
+      </p:pic>
+      <p:sp>
+        <p:nvSpPr>
+          <p:cNvPr id="2" name="Title 1">
+            <a:extLst>
+              <a:ext uri="{FF2B5EF4-FFF2-40B4-BE49-F238E27FC236}">
+                <a16:creationId xmlns:a16="http://schemas.microsoft.com/office/drawing/2014/main" id="{97A79D67-053A-4210-98FC-A518CF5F186B}"/>
+              </a:ext>
+            </a:extLst>
+          </p:cNvPr>
+          <p:cNvSpPr>
+            <a:spLocks noGrp="1"/>
+          </p:cNvSpPr>
+          <p:nvPr>
+            <p:ph type="title"/>
+          </p:nvPr>
+        </p:nvSpPr>
+        <p:spPr>
+          <a:xfrm>
+            <a:off x="1098293" y="0"/>
+            <a:ext cx="6947413" cy="720958"/>
+          </a:xfrm>
+          <a:effectLst>
+            <a:outerShdw blurRad="50800" dist="50800" dir="5400000" algn="ctr" rotWithShape="0">
+              <a:schemeClr val="bg1"/>
+            </a:outerShdw>
+          </a:effectLst>
+        </p:spPr>
+        <p:txBody>
+          <a:bodyPr/>
+          <a:lstStyle/>
+          <a:p>
+            <a:pPr algn="ctr"/>
+            <a:r>
+              <a:rPr lang="en-US" b="1" u="sng" dirty="0">
+                <a:effectLst>
+                  <a:outerShdw blurRad="38100" dist="38100" dir="2700000" algn="tl">
+                    <a:srgbClr val="000000">
+                      <a:alpha val="43137"/>
+                    </a:srgbClr>
+                  </a:outerShdw>
+                </a:effectLst>
+              </a:rPr>
+              <a:t>Number of Covid Cases</a:t>
+            </a:r>
+          </a:p>
+        </p:txBody>
+      </p:sp>
+    </p:spTree>
+  </p:cSld>
+  <p:clrMapOvr>
+    <a:masterClrMapping/>
+  </p:clrMapOvr>
+  <mc:AlternateContent xmlns:mc="http://schemas.openxmlformats.org/markup-compatibility/2006" xmlns:p14="http://schemas.microsoft.com/office/powerpoint/2010/main">
+    <mc:Choice Requires="p14">
+      <p:transition spd="slow" p14:dur="2000">
+        <p14:reveal/>
+      </p:transition>
+    </mc:Choice>
+    <mc:Fallback xmlns="">
+      <p:transition spd="slow">
+        <p:fade/>
+      </p:transition>
+    </mc:Fallback>
+  </mc:AlternateContent>
+</p:sld>
+</file>
+
+<file path=ppt/slides/slide12.xml><?xml version="1.0" encoding="utf-8"?>
+<p:sld xmlns:a="http://schemas.openxmlformats.org/drawingml/2006/main" xmlns:r="http://schemas.openxmlformats.org/officeDocument/2006/relationships" xmlns:p="http://schemas.openxmlformats.org/presentationml/2006/main">
+  <p:cSld>
+    <p:spTree>
+      <p:nvGrpSpPr>
+        <p:cNvPr id="1" name=""/>
+        <p:cNvGrpSpPr/>
+        <p:nvPr/>
+      </p:nvGrpSpPr>
+      <p:grpSpPr>
+        <a:xfrm>
+          <a:off x="0" y="0"/>
+          <a:ext cx="0" cy="0"/>
+          <a:chOff x="0" y="0"/>
+          <a:chExt cx="0" cy="0"/>
+        </a:xfrm>
+      </p:grpSpPr>
+      <p:pic>
+        <p:nvPicPr>
           <p:cNvPr id="3" name="Screen Shot 2021-04-13 at 12.14.34 AM.png" descr="Screen Shot 2021-04-13 at 12.14.34 AM.png">
             <a:extLst>
               <a:ext uri="{FF2B5EF4-FFF2-40B4-BE49-F238E27FC236}">
@@ -14020,8 +14479,8 @@
         </p:blipFill>
         <p:spPr>
           <a:xfrm>
-            <a:off x="291254" y="53002"/>
-            <a:ext cx="8385386" cy="5037496"/>
+            <a:off x="1306540" y="980371"/>
+            <a:ext cx="6530918" cy="3923430"/>
           </a:xfrm>
           <a:prstGeom prst="rect">
             <a:avLst/>
@@ -14031,6 +14490,55 @@
           </a:ln>
         </p:spPr>
       </p:pic>
+      <p:sp>
+        <p:nvSpPr>
+          <p:cNvPr id="2" name="Title 1">
+            <a:extLst>
+              <a:ext uri="{FF2B5EF4-FFF2-40B4-BE49-F238E27FC236}">
+                <a16:creationId xmlns:a16="http://schemas.microsoft.com/office/drawing/2014/main" id="{54E6A084-C889-45F1-A6F6-192F938CD397}"/>
+              </a:ext>
+            </a:extLst>
+          </p:cNvPr>
+          <p:cNvSpPr>
+            <a:spLocks noGrp="1"/>
+          </p:cNvSpPr>
+          <p:nvPr>
+            <p:ph type="title"/>
+          </p:nvPr>
+        </p:nvSpPr>
+        <p:spPr>
+          <a:xfrm>
+            <a:off x="1069892" y="115411"/>
+            <a:ext cx="7004215" cy="709464"/>
+          </a:xfrm>
+          <a:effectLst>
+            <a:outerShdw blurRad="50800" dist="50800" dir="5400000" algn="ctr" rotWithShape="0">
+              <a:schemeClr val="bg1"/>
+            </a:outerShdw>
+          </a:effectLst>
+        </p:spPr>
+        <p:txBody>
+          <a:bodyPr>
+            <a:normAutofit/>
+          </a:bodyPr>
+          <a:lstStyle/>
+          <a:p>
+            <a:pPr algn="ctr"/>
+            <a:r>
+              <a:rPr lang="en-US" sz="3200" b="1" u="sng" dirty="0">
+                <a:effectLst>
+                  <a:outerShdw blurRad="38100" dist="38100" dir="2700000" algn="tl">
+                    <a:srgbClr val="000000">
+                      <a:alpha val="43137"/>
+                    </a:srgbClr>
+                  </a:outerShdw>
+                </a:effectLst>
+              </a:rPr>
+              <a:t>Number of Covid Deaths</a:t>
+            </a:r>
+          </a:p>
+        </p:txBody>
+      </p:sp>
     </p:spTree>
     <p:extLst>
       <p:ext uri="{BB962C8B-B14F-4D97-AF65-F5344CB8AC3E}">
@@ -14056,7 +14564,7 @@
 </p:sld>
 </file>
 
-<file path=ppt/slides/slide12.xml><?xml version="1.0" encoding="utf-8"?>
+<file path=ppt/slides/slide13.xml><?xml version="1.0" encoding="utf-8"?>
 <p:sld xmlns:a="http://schemas.openxmlformats.org/drawingml/2006/main" xmlns:r="http://schemas.openxmlformats.org/officeDocument/2006/relationships" xmlns:p="http://schemas.openxmlformats.org/presentationml/2006/main">
   <p:cSld>
     <p:spTree>
@@ -14149,7 +14657,7 @@
                 </a:effectLst>
                 <a:latin typeface="+mn-lt"/>
               </a:rPr>
-              <a:t>Total Deaths Bar Chart</a:t>
+              <a:t>Covid Deaths Bar Chart</a:t>
             </a:r>
             <a:br>
               <a:rPr lang="en-US" sz="2800" b="1" u="sng" dirty="0">
@@ -14193,7 +14701,7 @@
         </p:nvSpPr>
         <p:spPr>
           <a:xfrm>
-            <a:off x="1028700" y="1648963"/>
+            <a:off x="835025" y="1435899"/>
             <a:ext cx="7588250" cy="2559865"/>
           </a:xfrm>
           <a:prstGeom prst="rect">
@@ -14206,7 +14714,7 @@
           </a:effectLst>
           <a:extLst>
             <a:ext uri="{C572A759-6A51-4108-AA02-DFA0A04FC94B}">
-              <ma14:wrappingTextBoxFlag xmlns:ma14="http://schemas.microsoft.com/office/mac/drawingml/2011/main" xmlns:a14="http://schemas.microsoft.com/office/drawing/2010/main" xmlns:m="http://schemas.openxmlformats.org/officeDocument/2006/math" xmlns="" val="1"/>
+              <ma14:wrappingTextBoxFlag xmlns="" xmlns:m="http://schemas.openxmlformats.org/officeDocument/2006/math" xmlns:a14="http://schemas.microsoft.com/office/drawing/2010/main" xmlns:ma14="http://schemas.microsoft.com/office/mac/drawingml/2011/main" val="1"/>
             </a:ext>
           </a:extLst>
         </p:spPr>
@@ -14310,122 +14818,6 @@
         <p14:creationId xmlns:p14="http://schemas.microsoft.com/office/powerpoint/2010/main" val="570238601"/>
       </p:ext>
     </p:extLst>
-  </p:cSld>
-  <p:clrMapOvr>
-    <a:masterClrMapping/>
-  </p:clrMapOvr>
-  <mc:AlternateContent xmlns:mc="http://schemas.openxmlformats.org/markup-compatibility/2006" xmlns:p14="http://schemas.microsoft.com/office/powerpoint/2010/main">
-    <mc:Choice Requires="p14">
-      <p:transition spd="slow" p14:dur="2000">
-        <p14:reveal/>
-      </p:transition>
-    </mc:Choice>
-    <mc:Fallback xmlns="">
-      <p:transition spd="slow">
-        <p:fade/>
-      </p:transition>
-    </mc:Fallback>
-  </mc:AlternateContent>
-</p:sld>
-</file>
-
-<file path=ppt/slides/slide13.xml><?xml version="1.0" encoding="utf-8"?>
-<p:sld xmlns:a="http://schemas.openxmlformats.org/drawingml/2006/main" xmlns:r="http://schemas.openxmlformats.org/officeDocument/2006/relationships" xmlns:p="http://schemas.openxmlformats.org/presentationml/2006/main">
-  <p:cSld>
-    <p:spTree>
-      <p:nvGrpSpPr>
-        <p:cNvPr id="1" name=""/>
-        <p:cNvGrpSpPr/>
-        <p:nvPr/>
-      </p:nvGrpSpPr>
-      <p:grpSpPr>
-        <a:xfrm>
-          <a:off x="0" y="0"/>
-          <a:ext cx="0" cy="0"/>
-          <a:chOff x="0" y="0"/>
-          <a:chExt cx="0" cy="0"/>
-        </a:xfrm>
-      </p:grpSpPr>
-      <p:sp>
-        <p:nvSpPr>
-          <p:cNvPr id="300" name="Double-click to edit"/>
-          <p:cNvSpPr txBox="1">
-            <a:spLocks noGrp="1"/>
-          </p:cNvSpPr>
-          <p:nvPr>
-            <p:ph type="title"/>
-          </p:nvPr>
-        </p:nvSpPr>
-        <p:spPr>
-          <a:prstGeom prst="rect">
-            <a:avLst/>
-          </a:prstGeom>
-        </p:spPr>
-        <p:txBody>
-          <a:bodyPr>
-            <a:normAutofit/>
-          </a:bodyPr>
-          <a:lstStyle/>
-          <a:p>
-            <a:pPr marL="580339" indent="-580339" defTabSz="877823">
-              <a:buSzPts val="2600"/>
-              <a:defRPr sz="2688"/>
-            </a:pPr>
-            <a:endParaRPr dirty="0"/>
-          </a:p>
-        </p:txBody>
-      </p:sp>
-      <p:sp>
-        <p:nvSpPr>
-          <p:cNvPr id="301" name="Double-click to edit"/>
-          <p:cNvSpPr txBox="1">
-            <a:spLocks noGrp="1"/>
-          </p:cNvSpPr>
-          <p:nvPr>
-            <p:ph type="body" idx="1"/>
-          </p:nvPr>
-        </p:nvSpPr>
-        <p:spPr>
-          <a:prstGeom prst="rect">
-            <a:avLst/>
-          </a:prstGeom>
-        </p:spPr>
-        <p:txBody>
-          <a:bodyPr/>
-          <a:lstStyle/>
-          <a:p>
-            <a:endParaRPr dirty="0"/>
-          </a:p>
-        </p:txBody>
-      </p:sp>
-      <p:pic>
-        <p:nvPicPr>
-          <p:cNvPr id="302" name="Screen Shot 2021-04-13 at 1.50.45 PM.png" descr="Screen Shot 2021-04-13 at 1.50.45 PM.png"/>
-          <p:cNvPicPr>
-            <a:picLocks noChangeAspect="1"/>
-          </p:cNvPicPr>
-          <p:nvPr/>
-        </p:nvPicPr>
-        <p:blipFill>
-          <a:blip r:embed="rId2"/>
-          <a:stretch>
-            <a:fillRect/>
-          </a:stretch>
-        </p:blipFill>
-        <p:spPr>
-          <a:xfrm>
-            <a:off x="228600" y="349250"/>
-            <a:ext cx="8686800" cy="4445000"/>
-          </a:xfrm>
-          <a:prstGeom prst="rect">
-            <a:avLst/>
-          </a:prstGeom>
-          <a:ln w="12700">
-            <a:miter lim="400000"/>
-          </a:ln>
-        </p:spPr>
-      </p:pic>
-    </p:spTree>
   </p:cSld>
   <p:clrMapOvr>
     <a:masterClrMapping/>
@@ -14464,6 +14856,142 @@
       </p:grpSpPr>
       <p:sp>
         <p:nvSpPr>
+          <p:cNvPr id="2" name="Title 1">
+            <a:extLst>
+              <a:ext uri="{FF2B5EF4-FFF2-40B4-BE49-F238E27FC236}">
+                <a16:creationId xmlns:a16="http://schemas.microsoft.com/office/drawing/2014/main" id="{9883FFB5-7EEA-4788-857E-C410D75F2A9C}"/>
+              </a:ext>
+            </a:extLst>
+          </p:cNvPr>
+          <p:cNvSpPr>
+            <a:spLocks noGrp="1"/>
+          </p:cNvSpPr>
+          <p:nvPr>
+            <p:ph type="title"/>
+          </p:nvPr>
+        </p:nvSpPr>
+        <p:spPr>
+          <a:xfrm>
+            <a:off x="856059" y="22585"/>
+            <a:ext cx="7429499" cy="554464"/>
+          </a:xfrm>
+          <a:effectLst>
+            <a:outerShdw blurRad="50800" dist="50800" dir="5400000" algn="ctr" rotWithShape="0">
+              <a:schemeClr val="bg1"/>
+            </a:outerShdw>
+          </a:effectLst>
+        </p:spPr>
+        <p:txBody>
+          <a:bodyPr/>
+          <a:lstStyle/>
+          <a:p>
+            <a:pPr algn="ctr"/>
+            <a:r>
+              <a:rPr lang="en-US" b="1" u="sng" dirty="0">
+                <a:effectLst>
+                  <a:outerShdw blurRad="38100" dist="38100" dir="2700000" algn="tl">
+                    <a:srgbClr val="000000">
+                      <a:alpha val="43137"/>
+                    </a:srgbClr>
+                  </a:outerShdw>
+                </a:effectLst>
+              </a:rPr>
+              <a:t>Percentage of Covid Deaths</a:t>
+            </a:r>
+          </a:p>
+        </p:txBody>
+      </p:sp>
+      <p:sp>
+        <p:nvSpPr>
+          <p:cNvPr id="3" name="Text Placeholder 2">
+            <a:extLst>
+              <a:ext uri="{FF2B5EF4-FFF2-40B4-BE49-F238E27FC236}">
+                <a16:creationId xmlns:a16="http://schemas.microsoft.com/office/drawing/2014/main" id="{5A6C5E70-0D34-48D6-BC4C-BDE6C7335B10}"/>
+              </a:ext>
+            </a:extLst>
+          </p:cNvPr>
+          <p:cNvSpPr>
+            <a:spLocks noGrp="1"/>
+          </p:cNvSpPr>
+          <p:nvPr>
+            <p:ph type="body" idx="1"/>
+          </p:nvPr>
+        </p:nvSpPr>
+        <p:spPr/>
+        <p:txBody>
+          <a:bodyPr/>
+          <a:lstStyle/>
+          <a:p>
+            <a:endParaRPr lang="en-US" dirty="0"/>
+          </a:p>
+        </p:txBody>
+      </p:sp>
+      <p:pic>
+        <p:nvPicPr>
+          <p:cNvPr id="302" name="Screen Shot 2021-04-13 at 1.50.45 PM.png" descr="Screen Shot 2021-04-13 at 1.50.45 PM.png"/>
+          <p:cNvPicPr>
+            <a:picLocks noChangeAspect="1"/>
+          </p:cNvPicPr>
+          <p:nvPr/>
+        </p:nvPicPr>
+        <p:blipFill>
+          <a:blip r:embed="rId2"/>
+          <a:stretch>
+            <a:fillRect/>
+          </a:stretch>
+        </p:blipFill>
+        <p:spPr>
+          <a:xfrm>
+            <a:off x="641927" y="800099"/>
+            <a:ext cx="7857761" cy="4020784"/>
+          </a:xfrm>
+          <a:prstGeom prst="rect">
+            <a:avLst/>
+          </a:prstGeom>
+          <a:ln w="12700">
+            <a:miter lim="400000"/>
+          </a:ln>
+        </p:spPr>
+      </p:pic>
+    </p:spTree>
+  </p:cSld>
+  <p:clrMapOvr>
+    <a:masterClrMapping/>
+  </p:clrMapOvr>
+  <mc:AlternateContent xmlns:mc="http://schemas.openxmlformats.org/markup-compatibility/2006" xmlns:p14="http://schemas.microsoft.com/office/powerpoint/2010/main">
+    <mc:Choice Requires="p14">
+      <p:transition spd="slow" p14:dur="2000">
+        <p14:reveal/>
+      </p:transition>
+    </mc:Choice>
+    <mc:Fallback xmlns="">
+      <p:transition spd="slow">
+        <p:fade/>
+      </p:transition>
+    </mc:Fallback>
+  </mc:AlternateContent>
+</p:sld>
+</file>
+
+<file path=ppt/slides/slide15.xml><?xml version="1.0" encoding="utf-8"?>
+<p:sld xmlns:a="http://schemas.openxmlformats.org/drawingml/2006/main" xmlns:r="http://schemas.openxmlformats.org/officeDocument/2006/relationships" xmlns:p="http://schemas.openxmlformats.org/presentationml/2006/main">
+  <p:cSld>
+    <p:spTree>
+      <p:nvGrpSpPr>
+        <p:cNvPr id="1" name=""/>
+        <p:cNvGrpSpPr/>
+        <p:nvPr/>
+      </p:nvGrpSpPr>
+      <p:grpSpPr>
+        <a:xfrm>
+          <a:off x="0" y="0"/>
+          <a:ext cx="0" cy="0"/>
+          <a:chOff x="0" y="0"/>
+          <a:chExt cx="0" cy="0"/>
+        </a:xfrm>
+      </p:grpSpPr>
+      <p:sp>
+        <p:nvSpPr>
           <p:cNvPr id="304" name="Deaths Per COVID-19 Case"/>
           <p:cNvSpPr txBox="1">
             <a:spLocks noGrp="1"/>
@@ -14474,8 +15002,8 @@
         </p:nvSpPr>
         <p:spPr>
           <a:xfrm>
-            <a:off x="1028700" y="514350"/>
-            <a:ext cx="7200900" cy="485325"/>
+            <a:off x="971550" y="120818"/>
+            <a:ext cx="7200900" cy="891235"/>
           </a:xfrm>
           <a:prstGeom prst="rect">
             <a:avLst/>
@@ -14824,7 +15352,7 @@
           </a:effectLst>
           <a:extLst>
             <a:ext uri="{C572A759-6A51-4108-AA02-DFA0A04FC94B}">
-              <ma14:wrappingTextBoxFlag xmlns:ma14="http://schemas.microsoft.com/office/mac/drawingml/2011/main" xmlns:a14="http://schemas.microsoft.com/office/drawing/2010/main" xmlns:m="http://schemas.openxmlformats.org/officeDocument/2006/math" xmlns="" val="1"/>
+              <ma14:wrappingTextBoxFlag xmlns="" xmlns:m="http://schemas.openxmlformats.org/officeDocument/2006/math" xmlns:a14="http://schemas.microsoft.com/office/drawing/2010/main" xmlns:ma14="http://schemas.microsoft.com/office/mac/drawingml/2011/main" val="1"/>
             </a:ext>
           </a:extLst>
         </p:spPr>
@@ -15044,7 +15572,7 @@
 </p:sld>
 </file>
 
-<file path=ppt/slides/slide15.xml><?xml version="1.0" encoding="utf-8"?>
+<file path=ppt/slides/slide16.xml><?xml version="1.0" encoding="utf-8"?>
 <p:sld xmlns:a="http://schemas.openxmlformats.org/drawingml/2006/main" xmlns:r="http://schemas.openxmlformats.org/officeDocument/2006/relationships" xmlns:p="http://schemas.openxmlformats.org/presentationml/2006/main">
   <p:cSld>
     <p:spTree>
@@ -15204,7 +15732,7 @@
 </p:sld>
 </file>
 
-<file path=ppt/slides/slide16.xml><?xml version="1.0" encoding="utf-8"?>
+<file path=ppt/slides/slide17.xml><?xml version="1.0" encoding="utf-8"?>
 <p:sld xmlns:a="http://schemas.openxmlformats.org/drawingml/2006/main" xmlns:r="http://schemas.openxmlformats.org/officeDocument/2006/relationships" xmlns:p="http://schemas.openxmlformats.org/presentationml/2006/main">
   <p:cSld>
     <p:spTree>
@@ -15772,7 +16300,7 @@
           </a:effectLst>
           <a:extLst>
             <a:ext uri="{C572A759-6A51-4108-AA02-DFA0A04FC94B}">
-              <ma14:wrappingTextBoxFlag xmlns:ma14="http://schemas.microsoft.com/office/mac/drawingml/2011/main" xmlns:a14="http://schemas.microsoft.com/office/drawing/2010/main" xmlns:m="http://schemas.openxmlformats.org/officeDocument/2006/math" xmlns="" val="1"/>
+              <ma14:wrappingTextBoxFlag xmlns="" xmlns:m="http://schemas.openxmlformats.org/officeDocument/2006/math" xmlns:a14="http://schemas.microsoft.com/office/drawing/2010/main" xmlns:ma14="http://schemas.microsoft.com/office/mac/drawingml/2011/main" val="1"/>
             </a:ext>
           </a:extLst>
         </p:spPr>
@@ -15977,37 +16505,8 @@
                 </a:effectLst>
                 <a:latin typeface="Tw Cen MT (Body)"/>
               </a:rPr>
-              <a:t> Black Population- 2,214,270 (2,662</a:t>
+              <a:t> Black Population- 2,214,270 (2,662)</a:t>
             </a:r>
-            <a:r>
-              <a:rPr lang="en-US" sz="1600" b="1" dirty="0">
-                <a:solidFill>
-                  <a:srgbClr val="FFFFFF"/>
-                </a:solidFill>
-                <a:effectLst>
-                  <a:outerShdw blurRad="38100" dist="38100" dir="2700000" algn="tl">
-                    <a:srgbClr val="000000">
-                      <a:alpha val="43137"/>
-                    </a:srgbClr>
-                  </a:outerShdw>
-                </a:effectLst>
-                <a:latin typeface="Tw Cen MT (Body)"/>
-              </a:rPr>
-              <a:t>)</a:t>
-            </a:r>
-          </a:p>
-          <a:p>
-            <a:pPr lvl="2" defTabSz="361188">
-              <a:buClrTx/>
-              <a:buSzTx/>
-              <a:buNone/>
-              <a:defRPr sz="1303">
-                <a:latin typeface="+mj-lt"/>
-                <a:ea typeface="+mj-ea"/>
-                <a:cs typeface="+mj-cs"/>
-                <a:sym typeface="Helvetica"/>
-              </a:defRPr>
-            </a:pPr>
             <a:r>
               <a:rPr lang="en-US" sz="1600" b="1" dirty="0"/>
               <a:t>              </a:t>
@@ -16072,7 +16571,7 @@
 </p:sld>
 </file>
 
-<file path=ppt/slides/slide17.xml><?xml version="1.0" encoding="utf-8"?>
+<file path=ppt/slides/slide18.xml><?xml version="1.0" encoding="utf-8"?>
 <p:sld xmlns:a="http://schemas.openxmlformats.org/drawingml/2006/main" xmlns:r="http://schemas.openxmlformats.org/officeDocument/2006/relationships" xmlns:p="http://schemas.openxmlformats.org/presentationml/2006/main">
   <p:cSld>
     <p:spTree>
@@ -16375,7 +16874,7 @@
 </p:sld>
 </file>
 
-<file path=ppt/slides/slide18.xml><?xml version="1.0" encoding="utf-8"?>
+<file path=ppt/slides/slide19.xml><?xml version="1.0" encoding="utf-8"?>
 <p:sld xmlns:a="http://schemas.openxmlformats.org/drawingml/2006/main" xmlns:r="http://schemas.openxmlformats.org/officeDocument/2006/relationships" xmlns:p="http://schemas.openxmlformats.org/presentationml/2006/main">
   <p:cSld>
     <p:spTree>
@@ -16732,273 +17231,6 @@
     <mc:Choice Requires="p14">
       <p:transition spd="slow" p14:dur="2250">
         <p14:shred/>
-      </p:transition>
-    </mc:Choice>
-    <mc:Fallback xmlns="">
-      <p:transition spd="slow">
-        <p:fade/>
-      </p:transition>
-    </mc:Fallback>
-  </mc:AlternateContent>
-</p:sld>
-</file>
-
-<file path=ppt/slides/slide19.xml><?xml version="1.0" encoding="utf-8"?>
-<p:sld xmlns:a="http://schemas.openxmlformats.org/drawingml/2006/main" xmlns:r="http://schemas.openxmlformats.org/officeDocument/2006/relationships" xmlns:p="http://schemas.openxmlformats.org/presentationml/2006/main">
-  <p:cSld>
-    <p:spTree>
-      <p:nvGrpSpPr>
-        <p:cNvPr id="1" name=""/>
-        <p:cNvGrpSpPr/>
-        <p:nvPr/>
-      </p:nvGrpSpPr>
-      <p:grpSpPr>
-        <a:xfrm>
-          <a:off x="0" y="0"/>
-          <a:ext cx="0" cy="0"/>
-          <a:chOff x="0" y="0"/>
-          <a:chExt cx="0" cy="0"/>
-        </a:xfrm>
-      </p:grpSpPr>
-      <p:sp>
-        <p:nvSpPr>
-          <p:cNvPr id="304" name="Deaths Per COVID-19 Case"/>
-          <p:cNvSpPr txBox="1">
-            <a:spLocks noGrp="1"/>
-          </p:cNvSpPr>
-          <p:nvPr>
-            <p:ph type="title"/>
-          </p:nvPr>
-        </p:nvSpPr>
-        <p:spPr>
-          <a:xfrm>
-            <a:off x="2751438" y="148282"/>
-            <a:ext cx="4176584" cy="851394"/>
-          </a:xfrm>
-          <a:prstGeom prst="rect">
-            <a:avLst/>
-          </a:prstGeom>
-          <a:effectLst>
-            <a:outerShdw blurRad="50800" dist="50800" dir="5400000" algn="ctr" rotWithShape="0">
-              <a:schemeClr val="bg1"/>
-            </a:outerShdw>
-          </a:effectLst>
-        </p:spPr>
-        <p:txBody>
-          <a:bodyPr>
-            <a:noAutofit/>
-          </a:bodyPr>
-          <a:lstStyle>
-            <a:lvl1pPr marL="0" indent="0" defTabSz="457200">
-              <a:lnSpc>
-                <a:spcPct val="100000"/>
-              </a:lnSpc>
-              <a:buClrTx/>
-              <a:buSzTx/>
-              <a:buFontTx/>
-              <a:buNone/>
-              <a:defRPr sz="1800" b="1">
-                <a:solidFill>
-                  <a:srgbClr val="000000"/>
-                </a:solidFill>
-                <a:latin typeface="+mj-lt"/>
-                <a:ea typeface="+mj-ea"/>
-                <a:cs typeface="+mj-cs"/>
-                <a:sym typeface="Helvetica"/>
-              </a:defRPr>
-            </a:lvl1pPr>
-          </a:lstStyle>
-          <a:p>
-            <a:pPr algn="ctr"/>
-            <a:r>
-              <a:rPr lang="en-US" sz="3200" dirty="0">
-                <a:solidFill>
-                  <a:schemeClr val="tx1"/>
-                </a:solidFill>
-                <a:latin typeface="+mn-lt"/>
-              </a:rPr>
-              <a:t>Quote</a:t>
-            </a:r>
-            <a:endParaRPr sz="3200" dirty="0">
-              <a:solidFill>
-                <a:schemeClr val="tx1"/>
-              </a:solidFill>
-              <a:latin typeface="+mn-lt"/>
-            </a:endParaRPr>
-          </a:p>
-        </p:txBody>
-      </p:sp>
-      <p:sp>
-        <p:nvSpPr>
-          <p:cNvPr id="5" name="Shape 82">
-            <a:extLst>
-              <a:ext uri="{FF2B5EF4-FFF2-40B4-BE49-F238E27FC236}">
-                <a16:creationId xmlns:a16="http://schemas.microsoft.com/office/drawing/2014/main" id="{C0EE50C9-D0FE-4BF8-84B1-F6CAA03DC9D8}"/>
-              </a:ext>
-            </a:extLst>
-          </p:cNvPr>
-          <p:cNvSpPr txBox="1">
-            <a:spLocks noGrp="1"/>
-          </p:cNvSpPr>
-          <p:nvPr>
-            <p:ph type="body" sz="quarter" idx="1"/>
-          </p:nvPr>
-        </p:nvSpPr>
-        <p:spPr>
-          <a:xfrm>
-            <a:off x="1044575" y="1163638"/>
-            <a:ext cx="7778750" cy="3330575"/>
-          </a:xfrm>
-          <a:prstGeom prst="rect">
-            <a:avLst/>
-          </a:prstGeom>
-          <a:effectLst>
-            <a:outerShdw blurRad="50800" dist="50800" dir="5400000" algn="ctr" rotWithShape="0">
-              <a:schemeClr val="bg1"/>
-            </a:outerShdw>
-          </a:effectLst>
-          <a:extLst>
-            <a:ext uri="{C572A759-6A51-4108-AA02-DFA0A04FC94B}">
-              <ma14:wrappingTextBoxFlag xmlns="" xmlns:m="http://schemas.openxmlformats.org/officeDocument/2006/math" xmlns:a14="http://schemas.microsoft.com/office/drawing/2010/main" xmlns:ma14="http://schemas.microsoft.com/office/mac/drawingml/2011/main" val="1"/>
-            </a:ext>
-          </a:extLst>
-        </p:spPr>
-        <p:txBody>
-          <a:bodyPr/>
-          <a:lstStyle/>
-          <a:p>
-            <a:pPr marL="133350" indent="0">
-              <a:buNone/>
-            </a:pPr>
-            <a:r>
-              <a:rPr lang="en-US" sz="1800" b="1" dirty="0">
-                <a:solidFill>
-                  <a:srgbClr val="FFFFFF"/>
-                </a:solidFill>
-                <a:effectLst>
-                  <a:outerShdw blurRad="38100" dist="38100" dir="2700000" algn="tl">
-                    <a:srgbClr val="000000">
-                      <a:alpha val="43137"/>
-                    </a:srgbClr>
-                  </a:outerShdw>
-                </a:effectLst>
-                <a:latin typeface="+mn-lt"/>
-                <a:cs typeface="Arial" panose="020B0604020202020204" pitchFamily="34" charset="0"/>
-              </a:rPr>
-              <a:t>“We’ve compiled the race and ethnicity data that states are reporting for several COVID-19 data categories so that other researchers can begin to work with, analyze, and visualize this information. This is a challenging dataset to compile and code. While an increasing number of states and territories are providing race and ethnicity data, that data remains incomplete and inconsistent.”</a:t>
-            </a:r>
-          </a:p>
-          <a:p>
-            <a:pPr marL="133350" indent="0">
-              <a:buNone/>
-            </a:pPr>
-            <a:endParaRPr lang="en-US" dirty="0">
-              <a:solidFill>
-                <a:srgbClr val="FFFFFF"/>
-              </a:solidFill>
-              <a:latin typeface="+mn-lt"/>
-            </a:endParaRPr>
-          </a:p>
-          <a:p>
-            <a:pPr marL="133350" indent="0">
-              <a:buNone/>
-            </a:pPr>
-            <a:endParaRPr lang="en-US" dirty="0">
-              <a:solidFill>
-                <a:srgbClr val="FFFFFF"/>
-              </a:solidFill>
-              <a:uFill>
-                <a:solidFill>
-                  <a:schemeClr val="accent5"/>
-                </a:solidFill>
-              </a:uFill>
-              <a:latin typeface="+mn-lt"/>
-            </a:endParaRPr>
-          </a:p>
-          <a:p>
-            <a:pPr marL="0" indent="0" defTabSz="457200">
-              <a:buClrTx/>
-              <a:buSzTx/>
-              <a:buFontTx/>
-              <a:buNone/>
-              <a:defRPr sz="1650">
-                <a:latin typeface="+mj-lt"/>
-                <a:ea typeface="+mj-ea"/>
-                <a:cs typeface="+mj-cs"/>
-                <a:sym typeface="Helvetica"/>
-              </a:defRPr>
-            </a:pPr>
-            <a:r>
-              <a:rPr lang="en-US" dirty="0">
-                <a:solidFill>
-                  <a:srgbClr val="FFFFFF"/>
-                </a:solidFill>
-                <a:effectLst>
-                  <a:outerShdw blurRad="38100" dist="38100" dir="2700000" algn="tl">
-                    <a:srgbClr val="000000">
-                      <a:alpha val="43137"/>
-                    </a:srgbClr>
-                  </a:outerShdw>
-                </a:effectLst>
-                <a:latin typeface="+mn-lt"/>
-              </a:rPr>
-              <a:t>About the Racial Data Tracker | The COVID Tracking Project</a:t>
-            </a:r>
-          </a:p>
-          <a:p>
-            <a:pPr marL="0" indent="0" defTabSz="457200">
-              <a:buClrTx/>
-              <a:buSzTx/>
-              <a:buFontTx/>
-              <a:buNone/>
-              <a:defRPr sz="1650">
-                <a:latin typeface="+mj-lt"/>
-                <a:ea typeface="+mj-ea"/>
-                <a:cs typeface="+mj-cs"/>
-                <a:sym typeface="Helvetica"/>
-              </a:defRPr>
-            </a:pPr>
-            <a:r>
-              <a:rPr lang="en-US" u="sng" dirty="0">
-                <a:solidFill>
-                  <a:srgbClr val="92D050"/>
-                </a:solidFill>
-                <a:effectLst>
-                  <a:outerShdw blurRad="38100" dist="38100" dir="2700000" algn="tl">
-                    <a:srgbClr val="000000">
-                      <a:alpha val="43137"/>
-                    </a:srgbClr>
-                  </a:outerShdw>
-                </a:effectLst>
-                <a:uFill>
-                  <a:solidFill>
-                    <a:schemeClr val="accent5"/>
-                  </a:solidFill>
-                </a:uFill>
-                <a:latin typeface="+mn-lt"/>
-              </a:rPr>
-              <a:t>https://covidtracking.com/race</a:t>
-            </a:r>
-          </a:p>
-          <a:p>
-            <a:endParaRPr lang="en-US" dirty="0"/>
-          </a:p>
-        </p:txBody>
-      </p:sp>
-    </p:spTree>
-    <p:extLst>
-      <p:ext uri="{BB962C8B-B14F-4D97-AF65-F5344CB8AC3E}">
-        <p14:creationId xmlns:p14="http://schemas.microsoft.com/office/powerpoint/2010/main" val="2144418424"/>
-      </p:ext>
-    </p:extLst>
-  </p:cSld>
-  <p:clrMapOvr>
-    <a:masterClrMapping/>
-  </p:clrMapOvr>
-  <mc:AlternateContent xmlns:mc="http://schemas.openxmlformats.org/markup-compatibility/2006" xmlns:p14="http://schemas.microsoft.com/office/powerpoint/2010/main">
-    <mc:Choice Requires="p14">
-      <p:transition spd="slow" p14:dur="2000">
-        <p14:reveal/>
       </p:transition>
     </mc:Choice>
     <mc:Fallback xmlns="">
@@ -17194,6 +17426,273 @@
         </p:nvSpPr>
         <p:spPr>
           <a:xfrm>
+            <a:off x="2751438" y="148282"/>
+            <a:ext cx="4176584" cy="851394"/>
+          </a:xfrm>
+          <a:prstGeom prst="rect">
+            <a:avLst/>
+          </a:prstGeom>
+          <a:effectLst>
+            <a:outerShdw blurRad="50800" dist="50800" dir="5400000" algn="ctr" rotWithShape="0">
+              <a:schemeClr val="bg1"/>
+            </a:outerShdw>
+          </a:effectLst>
+        </p:spPr>
+        <p:txBody>
+          <a:bodyPr>
+            <a:noAutofit/>
+          </a:bodyPr>
+          <a:lstStyle>
+            <a:lvl1pPr marL="0" indent="0" defTabSz="457200">
+              <a:lnSpc>
+                <a:spcPct val="100000"/>
+              </a:lnSpc>
+              <a:buClrTx/>
+              <a:buSzTx/>
+              <a:buFontTx/>
+              <a:buNone/>
+              <a:defRPr sz="1800" b="1">
+                <a:solidFill>
+                  <a:srgbClr val="000000"/>
+                </a:solidFill>
+                <a:latin typeface="+mj-lt"/>
+                <a:ea typeface="+mj-ea"/>
+                <a:cs typeface="+mj-cs"/>
+                <a:sym typeface="Helvetica"/>
+              </a:defRPr>
+            </a:lvl1pPr>
+          </a:lstStyle>
+          <a:p>
+            <a:pPr algn="ctr"/>
+            <a:r>
+              <a:rPr lang="en-US" sz="3200" dirty="0">
+                <a:solidFill>
+                  <a:schemeClr val="tx1"/>
+                </a:solidFill>
+                <a:latin typeface="+mn-lt"/>
+              </a:rPr>
+              <a:t>Quote</a:t>
+            </a:r>
+            <a:endParaRPr sz="3200" dirty="0">
+              <a:solidFill>
+                <a:schemeClr val="tx1"/>
+              </a:solidFill>
+              <a:latin typeface="+mn-lt"/>
+            </a:endParaRPr>
+          </a:p>
+        </p:txBody>
+      </p:sp>
+      <p:sp>
+        <p:nvSpPr>
+          <p:cNvPr id="5" name="Shape 82">
+            <a:extLst>
+              <a:ext uri="{FF2B5EF4-FFF2-40B4-BE49-F238E27FC236}">
+                <a16:creationId xmlns:a16="http://schemas.microsoft.com/office/drawing/2014/main" id="{C0EE50C9-D0FE-4BF8-84B1-F6CAA03DC9D8}"/>
+              </a:ext>
+            </a:extLst>
+          </p:cNvPr>
+          <p:cNvSpPr txBox="1">
+            <a:spLocks noGrp="1"/>
+          </p:cNvSpPr>
+          <p:nvPr>
+            <p:ph type="body" sz="quarter" idx="1"/>
+          </p:nvPr>
+        </p:nvSpPr>
+        <p:spPr>
+          <a:xfrm>
+            <a:off x="1044575" y="1163638"/>
+            <a:ext cx="7778750" cy="3330575"/>
+          </a:xfrm>
+          <a:prstGeom prst="rect">
+            <a:avLst/>
+          </a:prstGeom>
+          <a:effectLst>
+            <a:outerShdw blurRad="50800" dist="50800" dir="5400000" algn="ctr" rotWithShape="0">
+              <a:schemeClr val="bg1"/>
+            </a:outerShdw>
+          </a:effectLst>
+          <a:extLst>
+            <a:ext uri="{C572A759-6A51-4108-AA02-DFA0A04FC94B}">
+              <ma14:wrappingTextBoxFlag xmlns:ma14="http://schemas.microsoft.com/office/mac/drawingml/2011/main" xmlns:a14="http://schemas.microsoft.com/office/drawing/2010/main" xmlns:m="http://schemas.openxmlformats.org/officeDocument/2006/math" xmlns="" val="1"/>
+            </a:ext>
+          </a:extLst>
+        </p:spPr>
+        <p:txBody>
+          <a:bodyPr/>
+          <a:lstStyle/>
+          <a:p>
+            <a:pPr marL="133350" indent="0">
+              <a:buNone/>
+            </a:pPr>
+            <a:r>
+              <a:rPr lang="en-US" sz="1800" b="1" dirty="0">
+                <a:solidFill>
+                  <a:srgbClr val="FFFFFF"/>
+                </a:solidFill>
+                <a:effectLst>
+                  <a:outerShdw blurRad="38100" dist="38100" dir="2700000" algn="tl">
+                    <a:srgbClr val="000000">
+                      <a:alpha val="43137"/>
+                    </a:srgbClr>
+                  </a:outerShdw>
+                </a:effectLst>
+                <a:latin typeface="+mn-lt"/>
+                <a:cs typeface="Arial" panose="020B0604020202020204" pitchFamily="34" charset="0"/>
+              </a:rPr>
+              <a:t>“We’ve compiled the race and ethnicity data that states are reporting for several COVID-19 data categories so that other researchers can begin to work with, analyze, and visualize this information. This is a challenging dataset to compile and code. While an increasing number of states and territories are providing race and ethnicity data, that data remains incomplete and inconsistent.”</a:t>
+            </a:r>
+          </a:p>
+          <a:p>
+            <a:pPr marL="133350" indent="0">
+              <a:buNone/>
+            </a:pPr>
+            <a:endParaRPr lang="en-US" dirty="0">
+              <a:solidFill>
+                <a:srgbClr val="FFFFFF"/>
+              </a:solidFill>
+              <a:latin typeface="+mn-lt"/>
+            </a:endParaRPr>
+          </a:p>
+          <a:p>
+            <a:pPr marL="133350" indent="0">
+              <a:buNone/>
+            </a:pPr>
+            <a:endParaRPr lang="en-US" dirty="0">
+              <a:solidFill>
+                <a:srgbClr val="FFFFFF"/>
+              </a:solidFill>
+              <a:uFill>
+                <a:solidFill>
+                  <a:schemeClr val="accent5"/>
+                </a:solidFill>
+              </a:uFill>
+              <a:latin typeface="+mn-lt"/>
+            </a:endParaRPr>
+          </a:p>
+          <a:p>
+            <a:pPr marL="0" indent="0" defTabSz="457200">
+              <a:buClrTx/>
+              <a:buSzTx/>
+              <a:buFontTx/>
+              <a:buNone/>
+              <a:defRPr sz="1650">
+                <a:latin typeface="+mj-lt"/>
+                <a:ea typeface="+mj-ea"/>
+                <a:cs typeface="+mj-cs"/>
+                <a:sym typeface="Helvetica"/>
+              </a:defRPr>
+            </a:pPr>
+            <a:r>
+              <a:rPr lang="en-US" dirty="0">
+                <a:solidFill>
+                  <a:srgbClr val="FFFFFF"/>
+                </a:solidFill>
+                <a:effectLst>
+                  <a:outerShdw blurRad="38100" dist="38100" dir="2700000" algn="tl">
+                    <a:srgbClr val="000000">
+                      <a:alpha val="43137"/>
+                    </a:srgbClr>
+                  </a:outerShdw>
+                </a:effectLst>
+                <a:latin typeface="+mn-lt"/>
+              </a:rPr>
+              <a:t>About the Racial Data Tracker | The COVID Tracking Project</a:t>
+            </a:r>
+          </a:p>
+          <a:p>
+            <a:pPr marL="0" indent="0" defTabSz="457200">
+              <a:buClrTx/>
+              <a:buSzTx/>
+              <a:buFontTx/>
+              <a:buNone/>
+              <a:defRPr sz="1650">
+                <a:latin typeface="+mj-lt"/>
+                <a:ea typeface="+mj-ea"/>
+                <a:cs typeface="+mj-cs"/>
+                <a:sym typeface="Helvetica"/>
+              </a:defRPr>
+            </a:pPr>
+            <a:r>
+              <a:rPr lang="en-US" u="sng" dirty="0">
+                <a:solidFill>
+                  <a:srgbClr val="92D050"/>
+                </a:solidFill>
+                <a:effectLst>
+                  <a:outerShdw blurRad="38100" dist="38100" dir="2700000" algn="tl">
+                    <a:srgbClr val="000000">
+                      <a:alpha val="43137"/>
+                    </a:srgbClr>
+                  </a:outerShdw>
+                </a:effectLst>
+                <a:uFill>
+                  <a:solidFill>
+                    <a:schemeClr val="accent5"/>
+                  </a:solidFill>
+                </a:uFill>
+                <a:latin typeface="+mn-lt"/>
+              </a:rPr>
+              <a:t>https://covidtracking.com/race</a:t>
+            </a:r>
+          </a:p>
+          <a:p>
+            <a:endParaRPr lang="en-US" dirty="0"/>
+          </a:p>
+        </p:txBody>
+      </p:sp>
+    </p:spTree>
+    <p:extLst>
+      <p:ext uri="{BB962C8B-B14F-4D97-AF65-F5344CB8AC3E}">
+        <p14:creationId xmlns:p14="http://schemas.microsoft.com/office/powerpoint/2010/main" val="2144418424"/>
+      </p:ext>
+    </p:extLst>
+  </p:cSld>
+  <p:clrMapOvr>
+    <a:masterClrMapping/>
+  </p:clrMapOvr>
+  <mc:AlternateContent xmlns:mc="http://schemas.openxmlformats.org/markup-compatibility/2006" xmlns:p14="http://schemas.microsoft.com/office/powerpoint/2010/main">
+    <mc:Choice Requires="p14">
+      <p:transition spd="slow" p14:dur="2000">
+        <p14:reveal/>
+      </p:transition>
+    </mc:Choice>
+    <mc:Fallback xmlns="">
+      <p:transition spd="slow">
+        <p:fade/>
+      </p:transition>
+    </mc:Fallback>
+  </mc:AlternateContent>
+</p:sld>
+</file>
+
+<file path=ppt/slides/slide21.xml><?xml version="1.0" encoding="utf-8"?>
+<p:sld xmlns:a="http://schemas.openxmlformats.org/drawingml/2006/main" xmlns:r="http://schemas.openxmlformats.org/officeDocument/2006/relationships" xmlns:p="http://schemas.openxmlformats.org/presentationml/2006/main">
+  <p:cSld>
+    <p:spTree>
+      <p:nvGrpSpPr>
+        <p:cNvPr id="1" name=""/>
+        <p:cNvGrpSpPr/>
+        <p:nvPr/>
+      </p:nvGrpSpPr>
+      <p:grpSpPr>
+        <a:xfrm>
+          <a:off x="0" y="0"/>
+          <a:ext cx="0" cy="0"/>
+          <a:chOff x="0" y="0"/>
+          <a:chExt cx="0" cy="0"/>
+        </a:xfrm>
+      </p:grpSpPr>
+      <p:sp>
+        <p:nvSpPr>
+          <p:cNvPr id="304" name="Deaths Per COVID-19 Case"/>
+          <p:cNvSpPr txBox="1">
+            <a:spLocks noGrp="1"/>
+          </p:cNvSpPr>
+          <p:nvPr>
+            <p:ph type="title"/>
+          </p:nvPr>
+        </p:nvSpPr>
+        <p:spPr>
+          <a:xfrm>
             <a:off x="2710249" y="444844"/>
             <a:ext cx="4374292" cy="815545"/>
           </a:xfrm>
@@ -17295,7 +17794,7 @@
           </a:effectLst>
           <a:extLst>
             <a:ext uri="{C572A759-6A51-4108-AA02-DFA0A04FC94B}">
-              <ma14:wrappingTextBoxFlag xmlns:ma14="http://schemas.microsoft.com/office/mac/drawingml/2011/main" xmlns:a14="http://schemas.microsoft.com/office/drawing/2010/main" xmlns:m="http://schemas.openxmlformats.org/officeDocument/2006/math" xmlns="" val="1"/>
+              <ma14:wrappingTextBoxFlag xmlns="" xmlns:m="http://schemas.openxmlformats.org/officeDocument/2006/math" xmlns:a14="http://schemas.microsoft.com/office/drawing/2010/main" xmlns:ma14="http://schemas.microsoft.com/office/mac/drawingml/2011/main" val="1"/>
             </a:ext>
           </a:extLst>
         </p:spPr>
@@ -17555,7 +18054,7 @@
 </p:sld>
 </file>
 
-<file path=ppt/slides/slide21.xml><?xml version="1.0" encoding="utf-8"?>
+<file path=ppt/slides/slide22.xml><?xml version="1.0" encoding="utf-8"?>
 <p:sld xmlns:a="http://schemas.openxmlformats.org/drawingml/2006/main" xmlns:r="http://schemas.openxmlformats.org/officeDocument/2006/relationships" xmlns:p="http://schemas.openxmlformats.org/presentationml/2006/main">
   <p:cSld>
     <p:spTree>
@@ -17755,7 +18254,7 @@
         </p:nvSpPr>
         <p:spPr>
           <a:xfrm>
-            <a:off x="1028700" y="514350"/>
+            <a:off x="971550" y="274652"/>
             <a:ext cx="7200900" cy="737801"/>
           </a:xfrm>
           <a:prstGeom prst="rect">
@@ -17779,7 +18278,7 @@
               <a:buNone/>
             </a:pPr>
             <a:r>
-              <a:rPr lang="en-US" sz="2800" b="1" u="sng" dirty="0">
+              <a:rPr lang="en-US" sz="3200" b="1" u="sng" dirty="0">
                 <a:solidFill>
                   <a:schemeClr val="tx1"/>
                 </a:solidFill>
@@ -17811,7 +18310,7 @@
         </p:nvSpPr>
         <p:spPr>
           <a:xfrm>
-            <a:off x="717977" y="1765738"/>
+            <a:off x="531546" y="1703474"/>
             <a:ext cx="3332989" cy="1736551"/>
           </a:xfrm>
           <a:prstGeom prst="rect">
@@ -17824,7 +18323,7 @@
           </a:effectLst>
           <a:extLst>
             <a:ext uri="{C572A759-6A51-4108-AA02-DFA0A04FC94B}">
-              <ma14:wrappingTextBoxFlag xmlns="" xmlns:m="http://schemas.openxmlformats.org/officeDocument/2006/math" xmlns:a14="http://schemas.microsoft.com/office/drawing/2010/main" xmlns:ma14="http://schemas.microsoft.com/office/mac/drawingml/2011/main" val="1"/>
+              <ma14:wrappingTextBoxFlag xmlns:ma14="http://schemas.microsoft.com/office/mac/drawingml/2011/main" xmlns:a14="http://schemas.microsoft.com/office/drawing/2010/main" xmlns:m="http://schemas.openxmlformats.org/officeDocument/2006/math" xmlns="" val="1"/>
             </a:ext>
           </a:extLst>
         </p:spPr>
@@ -18106,7 +18605,7 @@
           </a:effectLst>
           <a:extLst>
             <a:ext uri="{C572A759-6A51-4108-AA02-DFA0A04FC94B}">
-              <ma14:wrappingTextBoxFlag xmlns:ma14="http://schemas.microsoft.com/office/mac/drawingml/2011/main" xmlns:a14="http://schemas.microsoft.com/office/drawing/2010/main" xmlns:m="http://schemas.openxmlformats.org/officeDocument/2006/math" xmlns="" val="1"/>
+              <ma14:wrappingTextBoxFlag xmlns="" xmlns:m="http://schemas.openxmlformats.org/officeDocument/2006/math" xmlns:a14="http://schemas.microsoft.com/office/drawing/2010/main" xmlns:ma14="http://schemas.microsoft.com/office/mac/drawingml/2011/main" val="1"/>
             </a:ext>
           </a:extLst>
         </p:spPr>
@@ -18343,7 +18842,7 @@
           </a:effectLst>
           <a:extLst>
             <a:ext uri="{C572A759-6A51-4108-AA02-DFA0A04FC94B}">
-              <ma14:wrappingTextBoxFlag xmlns:ma14="http://schemas.microsoft.com/office/mac/drawingml/2011/main" xmlns:a14="http://schemas.microsoft.com/office/drawing/2010/main" xmlns:m="http://schemas.openxmlformats.org/officeDocument/2006/math" xmlns="" val="1"/>
+              <ma14:wrappingTextBoxFlag xmlns="" xmlns:m="http://schemas.openxmlformats.org/officeDocument/2006/math" xmlns:a14="http://schemas.microsoft.com/office/drawing/2010/main" xmlns:ma14="http://schemas.microsoft.com/office/mac/drawingml/2011/main" val="1"/>
             </a:ext>
           </a:extLst>
         </p:spPr>
@@ -18555,7 +19054,7 @@
           </a:effectLst>
           <a:extLst>
             <a:ext uri="{C572A759-6A51-4108-AA02-DFA0A04FC94B}">
-              <ma14:wrappingTextBoxFlag xmlns:ma14="http://schemas.microsoft.com/office/mac/drawingml/2011/main" xmlns:a14="http://schemas.microsoft.com/office/drawing/2010/main" xmlns:m="http://schemas.openxmlformats.org/officeDocument/2006/math" xmlns="" val="1"/>
+              <ma14:wrappingTextBoxFlag xmlns="" xmlns:m="http://schemas.openxmlformats.org/officeDocument/2006/math" xmlns:a14="http://schemas.microsoft.com/office/drawing/2010/main" xmlns:ma14="http://schemas.microsoft.com/office/mac/drawingml/2011/main" val="1"/>
             </a:ext>
           </a:extLst>
         </p:spPr>
@@ -18647,7 +19146,7 @@
         </p:nvSpPr>
         <p:spPr>
           <a:xfrm>
-            <a:off x="1810386" y="189457"/>
+            <a:off x="1561812" y="50333"/>
             <a:ext cx="6390092" cy="807092"/>
           </a:xfrm>
           <a:prstGeom prst="rect">
@@ -18667,6 +19166,20 @@
           <a:p>
             <a:pPr algn="ctr"/>
             <a:r>
+              <a:rPr lang="en-US" sz="3200" b="1" u="sng" dirty="0">
+                <a:effectLst>
+                  <a:outerShdw blurRad="38100" dist="38100" dir="2700000" algn="tl">
+                    <a:srgbClr val="000000">
+                      <a:alpha val="43137"/>
+                    </a:srgbClr>
+                  </a:outerShdw>
+                </a:effectLst>
+                <a:latin typeface="+mn-lt"/>
+                <a:cs typeface="Arial" panose="020B0604020202020204" pitchFamily="34" charset="0"/>
+              </a:rPr>
+              <a:t>Original</a:t>
+            </a:r>
+            <a:r>
               <a:rPr lang="en-US" sz="2800" b="1" u="sng" dirty="0">
                 <a:effectLst>
                   <a:outerShdw blurRad="38100" dist="38100" dir="2700000" algn="tl">
@@ -18678,7 +19191,7 @@
                 <a:latin typeface="+mn-lt"/>
                 <a:cs typeface="Arial" panose="020B0604020202020204" pitchFamily="34" charset="0"/>
               </a:rPr>
-              <a:t>Original Questions</a:t>
+              <a:t> Questions</a:t>
             </a:r>
             <a:endParaRPr sz="2800" b="1" u="sng" dirty="0">
               <a:effectLst>
@@ -18829,7 +19342,7 @@
           </a:effectLst>
           <a:extLst>
             <a:ext uri="{C572A759-6A51-4108-AA02-DFA0A04FC94B}">
-              <ma14:wrappingTextBoxFlag xmlns="" xmlns:m="http://schemas.openxmlformats.org/officeDocument/2006/math" xmlns:a14="http://schemas.microsoft.com/office/drawing/2010/main" xmlns:ma14="http://schemas.microsoft.com/office/mac/drawingml/2011/main" val="1"/>
+              <ma14:wrappingTextBoxFlag xmlns:ma14="http://schemas.microsoft.com/office/mac/drawingml/2011/main" xmlns:a14="http://schemas.microsoft.com/office/drawing/2010/main" xmlns:m="http://schemas.openxmlformats.org/officeDocument/2006/math" xmlns="" val="1"/>
             </a:ext>
           </a:extLst>
         </p:spPr>
@@ -19016,7 +19529,7 @@
           </a:effectLst>
           <a:extLst>
             <a:ext uri="{C572A759-6A51-4108-AA02-DFA0A04FC94B}">
-              <ma14:wrappingTextBoxFlag xmlns="" xmlns:m="http://schemas.openxmlformats.org/officeDocument/2006/math" xmlns:a14="http://schemas.microsoft.com/office/drawing/2010/main" xmlns:ma14="http://schemas.microsoft.com/office/mac/drawingml/2011/main" val="1"/>
+              <ma14:wrappingTextBoxFlag xmlns:ma14="http://schemas.microsoft.com/office/mac/drawingml/2011/main" xmlns:a14="http://schemas.microsoft.com/office/drawing/2010/main" xmlns:m="http://schemas.openxmlformats.org/officeDocument/2006/math" xmlns="" val="1"/>
             </a:ext>
           </a:extLst>
         </p:spPr>
@@ -19199,7 +19712,7 @@
           </a:ln>
           <a:extLst>
             <a:ext uri="{C572A759-6A51-4108-AA02-DFA0A04FC94B}">
-              <ma14:wrappingTextBoxFlag xmlns="" xmlns:m="http://schemas.openxmlformats.org/officeDocument/2006/math" xmlns:a14="http://schemas.microsoft.com/office/drawing/2010/main" xmlns:ma14="http://schemas.microsoft.com/office/mac/drawingml/2011/main" val="1"/>
+              <ma14:wrappingTextBoxFlag xmlns:ma14="http://schemas.microsoft.com/office/mac/drawingml/2011/main" xmlns:a14="http://schemas.microsoft.com/office/drawing/2010/main" xmlns:m="http://schemas.openxmlformats.org/officeDocument/2006/math" xmlns="" val="1"/>
             </a:ext>
           </a:extLst>
         </p:spPr>
@@ -19274,7 +19787,7 @@
           <a:p>
             <a:pPr algn="ctr"/>
             <a:r>
-              <a:rPr lang="en-US" sz="2800" b="1" u="sng" dirty="0">
+              <a:rPr lang="en-US" sz="3200" b="1" u="sng" dirty="0">
                 <a:effectLst>
                   <a:outerShdw blurRad="38100" dist="38100" dir="2700000" algn="tl">
                     <a:srgbClr val="000000">
@@ -19282,12 +19795,11 @@
                     </a:srgbClr>
                   </a:outerShdw>
                 </a:effectLst>
-                <a:latin typeface="+mn-lt"/>
                 <a:cs typeface="Arial" panose="020B0604020202020204" pitchFamily="34" charset="0"/>
               </a:rPr>
               <a:t>Data Clean Up</a:t>
             </a:r>
-            <a:endParaRPr sz="2800" b="1" u="sng" dirty="0">
+            <a:endParaRPr sz="3200" b="1" u="sng" dirty="0">
               <a:effectLst>
                 <a:outerShdw blurRad="38100" dist="38100" dir="2700000" algn="tl">
                   <a:srgbClr val="000000">
@@ -19295,7 +19807,6 @@
                   </a:srgbClr>
                 </a:outerShdw>
               </a:effectLst>
-              <a:latin typeface="+mn-lt"/>
               <a:cs typeface="Arial" panose="020B0604020202020204" pitchFamily="34" charset="0"/>
             </a:endParaRPr>
           </a:p>
@@ -19617,7 +20128,7 @@
           </a:effectLst>
           <a:extLst>
             <a:ext uri="{C572A759-6A51-4108-AA02-DFA0A04FC94B}">
-              <ma14:wrappingTextBoxFlag xmlns:ma14="http://schemas.microsoft.com/office/mac/drawingml/2011/main" xmlns:a14="http://schemas.microsoft.com/office/drawing/2010/main" xmlns:m="http://schemas.openxmlformats.org/officeDocument/2006/math" xmlns="" val="1"/>
+              <ma14:wrappingTextBoxFlag xmlns="" xmlns:m="http://schemas.openxmlformats.org/officeDocument/2006/math" xmlns:a14="http://schemas.microsoft.com/office/drawing/2010/main" xmlns:ma14="http://schemas.microsoft.com/office/mac/drawingml/2011/main" val="1"/>
             </a:ext>
           </a:extLst>
         </p:spPr>
@@ -19923,7 +20434,7 @@
           </a:effectLst>
           <a:extLst>
             <a:ext uri="{C572A759-6A51-4108-AA02-DFA0A04FC94B}">
-              <ma14:wrappingTextBoxFlag xmlns:ma14="http://schemas.microsoft.com/office/mac/drawingml/2011/main" xmlns:a14="http://schemas.microsoft.com/office/drawing/2010/main" xmlns:m="http://schemas.openxmlformats.org/officeDocument/2006/math" xmlns="" val="1"/>
+              <ma14:wrappingTextBoxFlag xmlns="" xmlns:m="http://schemas.openxmlformats.org/officeDocument/2006/math" xmlns:a14="http://schemas.microsoft.com/office/drawing/2010/main" xmlns:ma14="http://schemas.microsoft.com/office/mac/drawingml/2011/main" val="1"/>
             </a:ext>
           </a:extLst>
         </p:spPr>
@@ -20125,7 +20636,7 @@
           </a:ln>
           <a:extLst>
             <a:ext uri="{C572A759-6A51-4108-AA02-DFA0A04FC94B}">
-              <ma14:wrappingTextBoxFlag xmlns:ma14="http://schemas.microsoft.com/office/mac/drawingml/2011/main" xmlns:a14="http://schemas.microsoft.com/office/drawing/2010/main" xmlns:m="http://schemas.openxmlformats.org/officeDocument/2006/math" xmlns="" val="1"/>
+              <ma14:wrappingTextBoxFlag xmlns="" xmlns:m="http://schemas.openxmlformats.org/officeDocument/2006/math" xmlns:a14="http://schemas.microsoft.com/office/drawing/2010/main" xmlns:ma14="http://schemas.microsoft.com/office/mac/drawingml/2011/main" val="1"/>
             </a:ext>
           </a:extLst>
         </p:spPr>
@@ -20200,7 +20711,7 @@
           <a:p>
             <a:pPr algn="ctr"/>
             <a:r>
-              <a:rPr sz="2800" b="1" u="sng" dirty="0">
+              <a:rPr sz="3200" b="1" u="sng" dirty="0">
                 <a:effectLst>
                   <a:innerShdw blurRad="63500" dist="50800" dir="13500000">
                     <a:schemeClr val="bg1">
@@ -20208,7 +20719,6 @@
                     </a:schemeClr>
                   </a:innerShdw>
                 </a:effectLst>
-                <a:latin typeface="Arial" panose="020B0604020202020204" pitchFamily="34" charset="0"/>
                 <a:cs typeface="Arial" panose="020B0604020202020204" pitchFamily="34" charset="0"/>
               </a:rPr>
               <a:t>Revised Questions</a:t>
@@ -20503,7 +21013,7 @@
         </p:nvSpPr>
         <p:spPr>
           <a:xfrm>
-            <a:off x="1111244" y="1097919"/>
+            <a:off x="1111244" y="938710"/>
             <a:ext cx="3257003" cy="3984621"/>
           </a:xfrm>
           <a:prstGeom prst="rect">
@@ -20519,7 +21029,7 @@
           </a:effectLst>
           <a:extLst>
             <a:ext uri="{C572A759-6A51-4108-AA02-DFA0A04FC94B}">
-              <ma14:wrappingTextBoxFlag xmlns="" xmlns:m="http://schemas.openxmlformats.org/officeDocument/2006/math" xmlns:a14="http://schemas.microsoft.com/office/drawing/2010/main" xmlns:ma14="http://schemas.microsoft.com/office/mac/drawingml/2011/main" val="1"/>
+              <ma14:wrappingTextBoxFlag xmlns:ma14="http://schemas.microsoft.com/office/mac/drawingml/2011/main" xmlns:a14="http://schemas.microsoft.com/office/drawing/2010/main" xmlns:m="http://schemas.openxmlformats.org/officeDocument/2006/math" xmlns="" val="1"/>
             </a:ext>
           </a:extLst>
         </p:spPr>
@@ -20972,7 +21482,7 @@
         </p:nvSpPr>
         <p:spPr>
           <a:xfrm>
-            <a:off x="5388532" y="938710"/>
+            <a:off x="5388532" y="761156"/>
             <a:ext cx="2723727" cy="2276929"/>
           </a:xfrm>
           <a:prstGeom prst="rect">
@@ -20988,7 +21498,7 @@
           </a:effectLst>
           <a:extLst>
             <a:ext uri="{C572A759-6A51-4108-AA02-DFA0A04FC94B}">
-              <ma14:wrappingTextBoxFlag xmlns="" xmlns:m="http://schemas.openxmlformats.org/officeDocument/2006/math" xmlns:a14="http://schemas.microsoft.com/office/drawing/2010/main" xmlns:ma14="http://schemas.microsoft.com/office/mac/drawingml/2011/main" val="1"/>
+              <ma14:wrappingTextBoxFlag xmlns:ma14="http://schemas.microsoft.com/office/mac/drawingml/2011/main" xmlns:a14="http://schemas.microsoft.com/office/drawing/2010/main" xmlns:m="http://schemas.openxmlformats.org/officeDocument/2006/math" xmlns="" val="1"/>
             </a:ext>
           </a:extLst>
         </p:spPr>
@@ -21254,7 +21764,7 @@
         </p:nvSpPr>
         <p:spPr>
           <a:xfrm>
-            <a:off x="1111244" y="136373"/>
+            <a:off x="1111244" y="0"/>
             <a:ext cx="7200901" cy="845750"/>
           </a:xfrm>
           <a:prstGeom prst="rect">
@@ -21280,8 +21790,7 @@
                 </a:solidFill>
                 <a:effectLst>
                   <a:innerShdw blurRad="63500" dist="50800" dir="13500000">
-                    <a:schemeClr val="tx2">
-                      <a:lumMod val="75000"/>
+                    <a:schemeClr val="bg1">
                       <a:alpha val="50000"/>
                     </a:schemeClr>
                   </a:innerShdw>
@@ -21294,8 +21803,7 @@
             <a:endParaRPr sz="2800" b="1" u="sng" dirty="0">
               <a:effectLst>
                 <a:innerShdw blurRad="63500" dist="50800" dir="13500000">
-                  <a:schemeClr val="tx2">
-                    <a:lumMod val="75000"/>
+                  <a:schemeClr val="bg1">
                     <a:alpha val="50000"/>
                   </a:schemeClr>
                 </a:innerShdw>
@@ -21332,6 +21840,97 @@
 </file>
 
 <file path=ppt/slides/slide8.xml><?xml version="1.0" encoding="utf-8"?>
+<p:sld xmlns:a="http://schemas.openxmlformats.org/drawingml/2006/main" xmlns:r="http://schemas.openxmlformats.org/officeDocument/2006/relationships" xmlns:p="http://schemas.openxmlformats.org/presentationml/2006/main">
+  <p:cSld>
+    <p:spTree>
+      <p:nvGrpSpPr>
+        <p:cNvPr id="1" name=""/>
+        <p:cNvGrpSpPr/>
+        <p:nvPr/>
+      </p:nvGrpSpPr>
+      <p:grpSpPr>
+        <a:xfrm>
+          <a:off x="0" y="0"/>
+          <a:ext cx="0" cy="0"/>
+          <a:chOff x="0" y="0"/>
+          <a:chExt cx="0" cy="0"/>
+        </a:xfrm>
+      </p:grpSpPr>
+      <p:sp>
+        <p:nvSpPr>
+          <p:cNvPr id="2" name="Title 1">
+            <a:extLst>
+              <a:ext uri="{FF2B5EF4-FFF2-40B4-BE49-F238E27FC236}">
+                <a16:creationId xmlns:a16="http://schemas.microsoft.com/office/drawing/2014/main" id="{CDDFFB13-2255-454B-92E3-1AEFF6F36E36}"/>
+              </a:ext>
+            </a:extLst>
+          </p:cNvPr>
+          <p:cNvSpPr>
+            <a:spLocks noGrp="1"/>
+          </p:cNvSpPr>
+          <p:nvPr>
+            <p:ph type="title"/>
+          </p:nvPr>
+        </p:nvSpPr>
+        <p:spPr>
+          <a:xfrm>
+            <a:off x="1006980" y="1609107"/>
+            <a:ext cx="7429499" cy="1108928"/>
+          </a:xfrm>
+          <a:effectLst>
+            <a:outerShdw blurRad="50800" dist="50800" dir="5400000" algn="ctr" rotWithShape="0">
+              <a:schemeClr val="bg1"/>
+            </a:outerShdw>
+          </a:effectLst>
+        </p:spPr>
+        <p:txBody>
+          <a:bodyPr>
+            <a:normAutofit/>
+          </a:bodyPr>
+          <a:lstStyle/>
+          <a:p>
+            <a:pPr algn="ctr"/>
+            <a:r>
+              <a:rPr lang="en-US" sz="3200" b="1" u="sng" dirty="0">
+                <a:effectLst>
+                  <a:innerShdw blurRad="63500" dist="50800" dir="13500000">
+                    <a:prstClr val="black">
+                      <a:alpha val="50000"/>
+                    </a:prstClr>
+                  </a:innerShdw>
+                </a:effectLst>
+              </a:rPr>
+              <a:t>Covid-19 Analysis For the Southeast Region</a:t>
+            </a:r>
+          </a:p>
+        </p:txBody>
+      </p:sp>
+    </p:spTree>
+    <p:extLst>
+      <p:ext uri="{BB962C8B-B14F-4D97-AF65-F5344CB8AC3E}">
+        <p14:creationId xmlns:p14="http://schemas.microsoft.com/office/powerpoint/2010/main" val="4225360146"/>
+      </p:ext>
+    </p:extLst>
+  </p:cSld>
+  <p:clrMapOvr>
+    <a:masterClrMapping/>
+  </p:clrMapOvr>
+  <mc:AlternateContent xmlns:mc="http://schemas.openxmlformats.org/markup-compatibility/2006">
+    <mc:Choice xmlns:p14="http://schemas.microsoft.com/office/powerpoint/2010/main" Requires="p14">
+      <p:transition spd="slow" p14:dur="2000">
+        <p14:reveal/>
+      </p:transition>
+    </mc:Choice>
+    <mc:Fallback>
+      <p:transition spd="slow">
+        <p:fade/>
+      </p:transition>
+    </mc:Fallback>
+  </mc:AlternateContent>
+</p:sld>
+</file>
+
+<file path=ppt/slides/slide9.xml><?xml version="1.0" encoding="utf-8"?>
 <p:sld xmlns:a="http://schemas.openxmlformats.org/drawingml/2006/main" xmlns:r="http://schemas.openxmlformats.org/officeDocument/2006/relationships" xmlns:p="http://schemas.openxmlformats.org/presentationml/2006/main">
   <p:cSld>
     <p:spTree>
@@ -21442,138 +22041,6 @@
     <p:extLst>
       <p:ext uri="{BB962C8B-B14F-4D97-AF65-F5344CB8AC3E}">
         <p14:creationId xmlns:p14="http://schemas.microsoft.com/office/powerpoint/2010/main" val="1986529300"/>
-      </p:ext>
-    </p:extLst>
-  </p:cSld>
-  <p:clrMapOvr>
-    <a:masterClrMapping/>
-  </p:clrMapOvr>
-  <mc:AlternateContent xmlns:mc="http://schemas.openxmlformats.org/markup-compatibility/2006" xmlns:p14="http://schemas.microsoft.com/office/powerpoint/2010/main">
-    <mc:Choice Requires="p14">
-      <p:transition spd="slow" p14:dur="2000">
-        <p14:reveal/>
-      </p:transition>
-    </mc:Choice>
-    <mc:Fallback xmlns="">
-      <p:transition spd="slow">
-        <p:fade/>
-      </p:transition>
-    </mc:Fallback>
-  </mc:AlternateContent>
-</p:sld>
-</file>
-
-<file path=ppt/slides/slide9.xml><?xml version="1.0" encoding="utf-8"?>
-<p:sld xmlns:a="http://schemas.openxmlformats.org/drawingml/2006/main" xmlns:r="http://schemas.openxmlformats.org/officeDocument/2006/relationships" xmlns:p="http://schemas.openxmlformats.org/presentationml/2006/main">
-  <p:cSld>
-    <p:spTree>
-      <p:nvGrpSpPr>
-        <p:cNvPr id="1" name=""/>
-        <p:cNvGrpSpPr/>
-        <p:nvPr/>
-      </p:nvGrpSpPr>
-      <p:grpSpPr>
-        <a:xfrm>
-          <a:off x="0" y="0"/>
-          <a:ext cx="0" cy="0"/>
-          <a:chOff x="0" y="0"/>
-          <a:chExt cx="0" cy="0"/>
-        </a:xfrm>
-      </p:grpSpPr>
-      <p:pic>
-        <p:nvPicPr>
-          <p:cNvPr id="15" name="Picture 14" descr="Chart, bar chart&#10;&#10;Description automatically generated">
-            <a:extLst>
-              <a:ext uri="{FF2B5EF4-FFF2-40B4-BE49-F238E27FC236}">
-                <a16:creationId xmlns:a16="http://schemas.microsoft.com/office/drawing/2014/main" id="{AFA02275-8121-414E-BF5D-E68354D067B0}"/>
-              </a:ext>
-            </a:extLst>
-          </p:cNvPr>
-          <p:cNvPicPr>
-            <a:picLocks noChangeAspect="1"/>
-          </p:cNvPicPr>
-          <p:nvPr/>
-        </p:nvPicPr>
-        <p:blipFill>
-          <a:blip r:embed="rId2"/>
-          <a:stretch>
-            <a:fillRect/>
-          </a:stretch>
-        </p:blipFill>
-        <p:spPr>
-          <a:xfrm>
-            <a:off x="3360235" y="2791794"/>
-            <a:ext cx="5783765" cy="2351706"/>
-          </a:xfrm>
-          <a:prstGeom prst="rect">
-            <a:avLst/>
-          </a:prstGeom>
-        </p:spPr>
-      </p:pic>
-      <p:pic>
-        <p:nvPicPr>
-          <p:cNvPr id="6" name="Picture 5" descr="Table&#10;&#10;Description automatically generated">
-            <a:extLst>
-              <a:ext uri="{FF2B5EF4-FFF2-40B4-BE49-F238E27FC236}">
-                <a16:creationId xmlns:a16="http://schemas.microsoft.com/office/drawing/2014/main" id="{B5DEC9C2-CE5F-41E0-89C8-48F546FB110D}"/>
-              </a:ext>
-            </a:extLst>
-          </p:cNvPr>
-          <p:cNvPicPr>
-            <a:picLocks noChangeAspect="1"/>
-          </p:cNvPicPr>
-          <p:nvPr/>
-        </p:nvPicPr>
-        <p:blipFill>
-          <a:blip r:embed="rId3"/>
-          <a:stretch>
-            <a:fillRect/>
-          </a:stretch>
-        </p:blipFill>
-        <p:spPr>
-          <a:xfrm>
-            <a:off x="0" y="0"/>
-            <a:ext cx="3343864" cy="5143500"/>
-          </a:xfrm>
-          <a:prstGeom prst="rect">
-            <a:avLst/>
-          </a:prstGeom>
-        </p:spPr>
-      </p:pic>
-      <p:pic>
-        <p:nvPicPr>
-          <p:cNvPr id="9" name="Picture 8" descr="Table&#10;&#10;Description automatically generated">
-            <a:extLst>
-              <a:ext uri="{FF2B5EF4-FFF2-40B4-BE49-F238E27FC236}">
-                <a16:creationId xmlns:a16="http://schemas.microsoft.com/office/drawing/2014/main" id="{17E5510B-580D-48F2-9BAF-39F3BD7B2FF1}"/>
-              </a:ext>
-            </a:extLst>
-          </p:cNvPr>
-          <p:cNvPicPr>
-            <a:picLocks noChangeAspect="1"/>
-          </p:cNvPicPr>
-          <p:nvPr/>
-        </p:nvPicPr>
-        <p:blipFill>
-          <a:blip r:embed="rId4"/>
-          <a:stretch>
-            <a:fillRect/>
-          </a:stretch>
-        </p:blipFill>
-        <p:spPr>
-          <a:xfrm>
-            <a:off x="3360235" y="0"/>
-            <a:ext cx="5783766" cy="2771326"/>
-          </a:xfrm>
-          <a:prstGeom prst="rect">
-            <a:avLst/>
-          </a:prstGeom>
-        </p:spPr>
-      </p:pic>
-    </p:spTree>
-    <p:extLst>
-      <p:ext uri="{BB962C8B-B14F-4D97-AF65-F5344CB8AC3E}">
-        <p14:creationId xmlns:p14="http://schemas.microsoft.com/office/powerpoint/2010/main" val="4135915655"/>
       </p:ext>
     </p:extLst>
   </p:cSld>

</xml_diff>